<commit_message>
finished kmu pres beta. off guidelines
</commit_message>
<xml_diff>
--- a/kmu.pptx
+++ b/kmu.pptx
@@ -5,10 +5,10 @@
     <p:sldMasterId r:id="rId1"/>
   </p:sldMasterIdLst>
   <p:notesMasterIdLst>
-    <p:notesMasterId r:id="rId29"/>
+    <p:notesMasterId r:id="rId27"/>
   </p:notesMasterIdLst>
   <p:handoutMasterIdLst>
-    <p:handoutMasterId r:id="rId30"/>
+    <p:handoutMasterId r:id="rId28"/>
   </p:handoutMasterIdLst>
   <p:sldIdLst>
     <p:sldId id="256" r:id="rId2"/>
@@ -32,12 +32,10 @@
     <p:sldId id="287" r:id="rId20"/>
     <p:sldId id="262" r:id="rId21"/>
     <p:sldId id="263" r:id="rId22"/>
-    <p:sldId id="288" r:id="rId23"/>
-    <p:sldId id="289" r:id="rId24"/>
-    <p:sldId id="290" r:id="rId25"/>
-    <p:sldId id="282" r:id="rId26"/>
-    <p:sldId id="283" r:id="rId27"/>
-    <p:sldId id="272" r:id="rId28"/>
+    <p:sldId id="289" r:id="rId23"/>
+    <p:sldId id="290" r:id="rId24"/>
+    <p:sldId id="282" r:id="rId25"/>
+    <p:sldId id="283" r:id="rId26"/>
   </p:sldIdLst>
   <p:sldSz cx="9144000" cy="6858000" type="screen4x3"/>
   <p:notesSz cx="6858000" cy="9144000"/>
@@ -222,7 +220,7 @@
             <a:fld id="{681E3AA8-99B6-994D-8093-324A8578893C}" type="datetimeFigureOut">
               <a:rPr lang="en-US" smtClean="0"/>
               <a:pPr/>
-              <a:t>4/19/10</a:t>
+              <a:t>4/20/10</a:t>
             </a:fld>
             <a:endParaRPr lang="en-US"/>
           </a:p>
@@ -385,7 +383,7 @@
             <a:fld id="{F3D44381-B94C-7F42-9C7A-1C7FF6B2A48E}" type="datetimeFigureOut">
               <a:rPr lang="en-US" smtClean="0"/>
               <a:pPr/>
-              <a:t>4/19/10</a:t>
+              <a:t>4/20/10</a:t>
             </a:fld>
             <a:endParaRPr lang="en-US"/>
           </a:p>
@@ -834,7 +832,7 @@
             <a:fld id="{DAEEE301-535B-D346-A0C4-8E493DC0F177}" type="datetime1">
               <a:rPr lang="en-US" smtClean="0"/>
               <a:pPr/>
-              <a:t>4/19/10</a:t>
+              <a:t>4/20/10</a:t>
             </a:fld>
             <a:endParaRPr lang="en-US"/>
           </a:p>
@@ -1001,7 +999,7 @@
             <a:fld id="{24EB77BD-4A35-0F4F-A41E-6C5E1B2079B6}" type="datetime1">
               <a:rPr lang="en-US" smtClean="0"/>
               <a:pPr/>
-              <a:t>4/19/10</a:t>
+              <a:t>4/20/10</a:t>
             </a:fld>
             <a:endParaRPr lang="en-US"/>
           </a:p>
@@ -1178,7 +1176,7 @@
             <a:fld id="{299DE1D7-BDA6-F648-A3D4-C52DC88391AB}" type="datetime1">
               <a:rPr lang="en-US" smtClean="0"/>
               <a:pPr/>
-              <a:t>4/19/10</a:t>
+              <a:t>4/20/10</a:t>
             </a:fld>
             <a:endParaRPr lang="en-US"/>
           </a:p>
@@ -1345,7 +1343,7 @@
             <a:fld id="{634A1968-9A5E-C042-93A3-3E6C63B5479A}" type="datetime1">
               <a:rPr lang="en-US" smtClean="0"/>
               <a:pPr/>
-              <a:t>4/19/10</a:t>
+              <a:t>4/20/10</a:t>
             </a:fld>
             <a:endParaRPr lang="en-US"/>
           </a:p>
@@ -1588,7 +1586,7 @@
             <a:fld id="{884AD493-4645-0047-AD79-19041E219B12}" type="datetime1">
               <a:rPr lang="en-US" smtClean="0"/>
               <a:pPr/>
-              <a:t>4/19/10</a:t>
+              <a:t>4/20/10</a:t>
             </a:fld>
             <a:endParaRPr lang="en-US"/>
           </a:p>
@@ -1873,7 +1871,7 @@
             <a:fld id="{6152ADC5-0872-C545-A4C2-4E1D97470D5E}" type="datetime1">
               <a:rPr lang="en-US" smtClean="0"/>
               <a:pPr/>
-              <a:t>4/19/10</a:t>
+              <a:t>4/20/10</a:t>
             </a:fld>
             <a:endParaRPr lang="en-US"/>
           </a:p>
@@ -2292,7 +2290,7 @@
             <a:fld id="{97E9E9C0-185E-0749-AB12-B62A3F50435F}" type="datetime1">
               <a:rPr lang="en-US" smtClean="0"/>
               <a:pPr/>
-              <a:t>4/19/10</a:t>
+              <a:t>4/20/10</a:t>
             </a:fld>
             <a:endParaRPr lang="en-US"/>
           </a:p>
@@ -2407,7 +2405,7 @@
             <a:fld id="{445FE793-A399-5448-8393-F80938C28955}" type="datetime1">
               <a:rPr lang="en-US" smtClean="0"/>
               <a:pPr/>
-              <a:t>4/19/10</a:t>
+              <a:t>4/20/10</a:t>
             </a:fld>
             <a:endParaRPr lang="en-US"/>
           </a:p>
@@ -2499,7 +2497,7 @@
             <a:fld id="{5AD0E790-21C6-654E-9371-750939F48A2F}" type="datetime1">
               <a:rPr lang="en-US" smtClean="0"/>
               <a:pPr/>
-              <a:t>4/19/10</a:t>
+              <a:t>4/20/10</a:t>
             </a:fld>
             <a:endParaRPr lang="en-US"/>
           </a:p>
@@ -2773,7 +2771,7 @@
             <a:fld id="{563BCC64-BBCB-8543-88F1-BA1365F5E0B7}" type="datetime1">
               <a:rPr lang="en-US" smtClean="0"/>
               <a:pPr/>
-              <a:t>4/19/10</a:t>
+              <a:t>4/20/10</a:t>
             </a:fld>
             <a:endParaRPr lang="en-US"/>
           </a:p>
@@ -3023,7 +3021,7 @@
             <a:fld id="{CB1CF52D-C282-CE48-BAB4-0F263C65342C}" type="datetime1">
               <a:rPr lang="en-US" smtClean="0"/>
               <a:pPr/>
-              <a:t>4/19/10</a:t>
+              <a:t>4/20/10</a:t>
             </a:fld>
             <a:endParaRPr lang="en-US"/>
           </a:p>
@@ -3233,7 +3231,7 @@
             <a:fld id="{37D08352-6A0D-5845-820F-4E288BADAE07}" type="datetime1">
               <a:rPr lang="en-US" smtClean="0"/>
               <a:pPr/>
-              <a:t>4/19/10</a:t>
+              <a:t>4/20/10</a:t>
             </a:fld>
             <a:endParaRPr lang="en-US"/>
           </a:p>
@@ -3708,26 +3706,289 @@
             <p:ph type="subTitle" idx="1"/>
           </p:nvPr>
         </p:nvSpPr>
-        <p:spPr/>
+        <p:spPr>
+          <a:xfrm>
+            <a:off x="1371600" y="4191000"/>
+            <a:ext cx="7086600" cy="1752600"/>
+          </a:xfrm>
+        </p:spPr>
         <p:txBody>
           <a:bodyPr>
             <a:normAutofit/>
           </a:bodyPr>
           <a:lstStyle/>
           <a:p>
+            <a:pPr algn="r"/>
+            <a:r>
+              <a:rPr lang="ru-RU" sz="2400" dirty="0" smtClean="0">
+                <a:solidFill>
+                  <a:srgbClr val="000000"/>
+                </a:solidFill>
+              </a:rPr>
+              <a:t>Законов </a:t>
+            </a:r>
+            <a:r>
+              <a:rPr lang="ru-RU" sz="2400" dirty="0" smtClean="0">
+                <a:solidFill>
+                  <a:srgbClr val="000000"/>
+                </a:solidFill>
+              </a:rPr>
+              <a:t>Андрей Ю</a:t>
+            </a:r>
+            <a:r>
+              <a:rPr lang="ru-RU" sz="2400" dirty="0" smtClean="0">
+                <a:solidFill>
+                  <a:srgbClr val="000000"/>
+                </a:solidFill>
+              </a:rPr>
+              <a:t>рьевич</a:t>
+            </a:r>
+            <a:endParaRPr lang="ru-RU" sz="2400" dirty="0" smtClean="0">
+              <a:solidFill>
+                <a:srgbClr val="000000"/>
+              </a:solidFill>
+            </a:endParaRPr>
+          </a:p>
+          <a:p>
+            <a:pPr algn="r"/>
+            <a:r>
+              <a:rPr lang="ru-RU" sz="2400" dirty="0" smtClean="0">
+                <a:solidFill>
+                  <a:srgbClr val="000000"/>
+                </a:solidFill>
+              </a:rPr>
+              <a:t>Научный руководитель</a:t>
+            </a:r>
+            <a:r>
+              <a:rPr lang="en-US" sz="2400" dirty="0" smtClean="0">
+                <a:solidFill>
+                  <a:srgbClr val="000000"/>
+                </a:solidFill>
+              </a:rPr>
+              <a:t>: </a:t>
+            </a:r>
+            <a:r>
+              <a:rPr lang="en-US" sz="2400" dirty="0" err="1" smtClean="0">
+                <a:solidFill>
+                  <a:srgbClr val="000000"/>
+                </a:solidFill>
+              </a:rPr>
+              <a:t>Степанов</a:t>
+            </a:r>
+            <a:r>
+              <a:rPr lang="en-US" sz="2400" dirty="0" smtClean="0">
+                <a:solidFill>
+                  <a:srgbClr val="000000"/>
+                </a:solidFill>
+              </a:rPr>
+              <a:t> </a:t>
+            </a:r>
+            <a:r>
+              <a:rPr lang="en-US" sz="2400" dirty="0" err="1" smtClean="0">
+                <a:solidFill>
+                  <a:srgbClr val="000000"/>
+                </a:solidFill>
+              </a:rPr>
+              <a:t>Олег</a:t>
+            </a:r>
+            <a:r>
+              <a:rPr lang="en-US" sz="2400" dirty="0" smtClean="0">
+                <a:solidFill>
+                  <a:srgbClr val="000000"/>
+                </a:solidFill>
+              </a:rPr>
+              <a:t> </a:t>
+            </a:r>
+            <a:r>
+              <a:rPr lang="en-US" sz="2400" dirty="0" err="1" smtClean="0">
+                <a:solidFill>
+                  <a:srgbClr val="000000"/>
+                </a:solidFill>
+              </a:rPr>
+              <a:t>Георгиевич</a:t>
+            </a:r>
+            <a:r>
+              <a:rPr lang="en-US" sz="2400" dirty="0" smtClean="0">
+                <a:solidFill>
+                  <a:srgbClr val="000000"/>
+                </a:solidFill>
+              </a:rPr>
+              <a:t>,</a:t>
+            </a:r>
+            <a:r>
+              <a:rPr lang="ru-RU" sz="2400" dirty="0" smtClean="0">
+                <a:solidFill>
+                  <a:srgbClr val="000000"/>
+                </a:solidFill>
+              </a:rPr>
+              <a:t> </a:t>
+            </a:r>
+            <a:r>
+              <a:rPr lang="en-US" sz="2400" dirty="0" err="1" smtClean="0">
+                <a:solidFill>
+                  <a:srgbClr val="000000"/>
+                </a:solidFill>
+              </a:rPr>
+              <a:t>к.т.н</a:t>
+            </a:r>
+            <a:r>
+              <a:rPr lang="en-US" sz="2400" dirty="0" smtClean="0">
+                <a:solidFill>
+                  <a:srgbClr val="000000"/>
+                </a:solidFill>
+              </a:rPr>
+              <a:t>.</a:t>
+            </a:r>
+            <a:r>
+              <a:rPr lang="en-US" sz="2400" dirty="0" smtClean="0">
+                <a:solidFill>
+                  <a:srgbClr val="000000"/>
+                </a:solidFill>
+              </a:rPr>
+              <a:t>,</a:t>
+            </a:r>
+            <a:r>
+              <a:rPr lang="ru-RU" sz="2400" dirty="0" smtClean="0">
+                <a:solidFill>
+                  <a:srgbClr val="000000"/>
+                </a:solidFill>
+              </a:rPr>
+              <a:t> </a:t>
+            </a:r>
+            <a:r>
+              <a:rPr lang="en-US" sz="2400" dirty="0" err="1" smtClean="0">
+                <a:solidFill>
+                  <a:srgbClr val="000000"/>
+                </a:solidFill>
+              </a:rPr>
+              <a:t>ассистент</a:t>
+            </a:r>
+            <a:r>
+              <a:rPr lang="en-US" sz="2400" dirty="0" smtClean="0">
+                <a:solidFill>
+                  <a:srgbClr val="000000"/>
+                </a:solidFill>
+              </a:rPr>
+              <a:t> </a:t>
+            </a:r>
+            <a:r>
+              <a:rPr lang="en-US" sz="2400" dirty="0" err="1" smtClean="0">
+                <a:solidFill>
+                  <a:srgbClr val="000000"/>
+                </a:solidFill>
+              </a:rPr>
+              <a:t>кафедры</a:t>
+            </a:r>
+            <a:r>
+              <a:rPr lang="en-US" sz="2400" dirty="0" smtClean="0">
+                <a:solidFill>
+                  <a:srgbClr val="000000"/>
+                </a:solidFill>
+              </a:rPr>
+              <a:t> </a:t>
+            </a:r>
+            <a:r>
+              <a:rPr lang="en-US" sz="2400" dirty="0" err="1" smtClean="0">
+                <a:solidFill>
+                  <a:srgbClr val="000000"/>
+                </a:solidFill>
+              </a:rPr>
+              <a:t>КТ</a:t>
+            </a:r>
+            <a:r>
+              <a:rPr lang="en-US" sz="2400" dirty="0" smtClean="0">
+                <a:solidFill>
+                  <a:srgbClr val="000000"/>
+                </a:solidFill>
+              </a:rPr>
+              <a:t> </a:t>
+            </a:r>
+            <a:endParaRPr lang="en-US" sz="2400" dirty="0">
+              <a:solidFill>
+                <a:srgbClr val="000000"/>
+              </a:solidFill>
+            </a:endParaRPr>
+          </a:p>
+        </p:txBody>
+      </p:sp>
+      <p:sp>
+        <p:nvSpPr>
+          <p:cNvPr id="4" name="Subtitle 2"/>
+          <p:cNvSpPr txBox="1">
+            <a:spLocks/>
+          </p:cNvSpPr>
+          <p:nvPr/>
+        </p:nvSpPr>
+        <p:spPr>
+          <a:xfrm>
+            <a:off x="685800" y="377825"/>
+            <a:ext cx="7772400" cy="1752600"/>
+          </a:xfrm>
+          <a:prstGeom prst="rect">
+            <a:avLst/>
+          </a:prstGeom>
+        </p:spPr>
+        <p:txBody>
+          <a:bodyPr vert="horz" lIns="91440" tIns="45720" rIns="91440" bIns="45720" rtlCol="0">
+            <a:normAutofit/>
+          </a:bodyPr>
+          <a:lstStyle/>
+          <a:p>
+            <a:pPr lvl="0" algn="ctr">
+              <a:spcBef>
+                <a:spcPct val="20000"/>
+              </a:spcBef>
+            </a:pPr>
             <a:r>
               <a:rPr lang="ru-RU" sz="2400" dirty="0" smtClean="0"/>
-              <a:t>Законов </a:t>
+              <a:t>Санкт-Петербургский государственный университет информационных технологий, механики и </a:t>
             </a:r>
             <a:r>
               <a:rPr lang="ru-RU" sz="2400" dirty="0" smtClean="0"/>
-              <a:t>А.Ю., СПбГУ ИТМО, ИТиП, гр</a:t>
-            </a:r>
+              <a:t>оптики</a:t>
+            </a:r>
+            <a:endParaRPr lang="ru-RU" sz="2400" dirty="0" smtClean="0">
+              <a:solidFill>
+                <a:schemeClr val="tx1">
+                  <a:tint val="75000"/>
+                </a:schemeClr>
+              </a:solidFill>
+            </a:endParaRPr>
+          </a:p>
+          <a:p>
+            <a:pPr lvl="0" algn="ctr">
+              <a:spcBef>
+                <a:spcPct val="20000"/>
+              </a:spcBef>
+            </a:pPr>
             <a:r>
               <a:rPr lang="ru-RU" sz="2400" dirty="0" smtClean="0"/>
-              <a:t>. 6538</a:t>
-            </a:r>
-            <a:endParaRPr lang="en-US" sz="2400" dirty="0"/>
+              <a:t>Кафедра </a:t>
+            </a:r>
+            <a:r>
+              <a:rPr lang="ru-RU" sz="2400" dirty="0" smtClean="0"/>
+              <a:t>Компьютерных </a:t>
+            </a:r>
+            <a:r>
+              <a:rPr lang="ru-RU" sz="2400" dirty="0" smtClean="0"/>
+              <a:t>Технологий</a:t>
+            </a:r>
+            <a:endParaRPr kumimoji="0" lang="en-US" sz="2400" b="0" i="0" u="none" strike="noStrike" kern="1200" cap="none" spc="0" normalizeH="0" baseline="0" noProof="0" dirty="0">
+              <a:ln>
+                <a:noFill/>
+              </a:ln>
+              <a:solidFill>
+                <a:schemeClr val="tx1">
+                  <a:tint val="75000"/>
+                </a:schemeClr>
+              </a:solidFill>
+              <a:effectLst/>
+              <a:uLnTx/>
+              <a:uFillTx/>
+              <a:latin typeface="+mn-lt"/>
+              <a:ea typeface="+mn-ea"/>
+              <a:cs typeface="+mn-cs"/>
+            </a:endParaRPr>
           </a:p>
         </p:txBody>
       </p:sp>
@@ -3786,11 +4047,7 @@
             </a:r>
             <a:r>
               <a:rPr lang="ru-RU" dirty="0" smtClean="0"/>
-              <a:t>С</a:t>
-            </a:r>
-            <a:r>
-              <a:rPr lang="ru-RU" dirty="0" smtClean="0"/>
-              <a:t>пецификация системы</a:t>
+              <a:t>Спецификация системы</a:t>
             </a:r>
             <a:r>
               <a:rPr lang="en-US" dirty="0" smtClean="0"/>
@@ -3983,26 +4240,6 @@
           <a:chExt cx="0" cy="0"/>
         </a:xfrm>
       </p:grpSpPr>
-      <p:graphicFrame>
-        <p:nvGraphicFramePr>
-          <p:cNvPr id="34819" name="Object 3"/>
-          <p:cNvGraphicFramePr>
-            <a:graphicFrameLocks noChangeAspect="1"/>
-          </p:cNvGraphicFramePr>
-          <p:nvPr/>
-        </p:nvGraphicFramePr>
-        <p:xfrm>
-          <a:off x="1143000" y="1659837"/>
-          <a:ext cx="6477000" cy="4771125"/>
-        </p:xfrm>
-        <a:graphic>
-          <a:graphicData uri="http://schemas.openxmlformats.org/presentationml/2006/ole">
-            <p:oleObj spid="_x0000_s34819" name="Document" r:id="rId3" imgW="3086100" imgH="2273300" progId="Word.Document.12">
-              <p:link updateAutomatic="1"/>
-            </p:oleObj>
-          </a:graphicData>
-        </a:graphic>
-      </p:graphicFrame>
       <p:sp>
         <p:nvSpPr>
           <p:cNvPr id="2" name="Title 1"/>
@@ -4027,15 +4264,7 @@
           <a:p>
             <a:r>
               <a:rPr lang="en-US" sz="2800" dirty="0" smtClean="0"/>
-              <a:t>@</a:t>
-            </a:r>
-            <a:r>
-              <a:rPr lang="en-US" sz="2800" dirty="0" err="1" smtClean="0"/>
-              <a:t>todo</a:t>
-            </a:r>
-            <a:r>
-              <a:rPr lang="en-US" sz="2800" dirty="0" smtClean="0"/>
-              <a:t> I</a:t>
+              <a:t>I</a:t>
             </a:r>
             <a:r>
               <a:rPr lang="en-US" sz="2800" dirty="0" smtClean="0"/>
@@ -4067,7 +4296,7 @@
         </p:spPr>
         <p:txBody>
           <a:bodyPr>
-            <a:normAutofit lnSpcReduction="10000"/>
+            <a:normAutofit/>
           </a:bodyPr>
           <a:lstStyle/>
           <a:p>
@@ -4112,13 +4341,6 @@
           <a:p>
             <a:pPr lvl="0"/>
             <a:endParaRPr lang="ru-RU" sz="2595" dirty="0" smtClean="0"/>
-          </a:p>
-          <a:p>
-            <a:pPr lvl="0"/>
-            <a:r>
-              <a:rPr lang="ru-RU" sz="2595" dirty="0" smtClean="0"/>
-              <a:t>Не учтены требования к объектам управления.</a:t>
-            </a:r>
           </a:p>
         </p:txBody>
       </p:sp>
@@ -4146,6 +4368,30 @@
           </a:p>
         </p:txBody>
       </p:sp>
+      <p:pic>
+        <p:nvPicPr>
+          <p:cNvPr id="6" name="Picture 5" descr="efsm.png"/>
+          <p:cNvPicPr>
+            <a:picLocks noChangeAspect="1"/>
+          </p:cNvPicPr>
+          <p:nvPr/>
+        </p:nvPicPr>
+        <p:blipFill>
+          <a:blip r:embed="rId2"/>
+          <a:stretch>
+            <a:fillRect/>
+          </a:stretch>
+        </p:blipFill>
+        <p:spPr>
+          <a:xfrm>
+            <a:off x="1530350" y="1936750"/>
+            <a:ext cx="6083300" cy="4419600"/>
+          </a:xfrm>
+          <a:prstGeom prst="rect">
+            <a:avLst/>
+          </a:prstGeom>
+        </p:spPr>
+      </p:pic>
     </p:spTree>
   </p:cSld>
   <p:clrMapOvr>
@@ -4205,11 +4451,7 @@
             </a:r>
             <a:r>
               <a:rPr lang="en-US" dirty="0" smtClean="0"/>
-              <a:t>:</a:t>
-            </a:r>
-            <a:r>
-              <a:rPr lang="en-US" dirty="0" smtClean="0"/>
-              <a:t> </a:t>
+              <a:t>: </a:t>
             </a:r>
             <a:r>
               <a:rPr lang="ru-RU" dirty="0" smtClean="0"/>
@@ -4435,11 +4677,7 @@
             </a:r>
             <a:r>
               <a:rPr lang="ru-RU" sz="2800" dirty="0" smtClean="0"/>
-              <a:t>Включение в модель требований к объектам </a:t>
-            </a:r>
-            <a:r>
-              <a:rPr lang="ru-RU" sz="2800" dirty="0" smtClean="0"/>
-              <a:t>управления и системе в целом</a:t>
+              <a:t>Включение в модель требований к объектам управления и системе в целом</a:t>
             </a:r>
             <a:endParaRPr lang="en-US" sz="2800" dirty="0"/>
           </a:p>
@@ -4470,34 +4708,35 @@
             <a:pPr lvl="0"/>
             <a:r>
               <a:rPr lang="ru-RU" sz="2595" dirty="0" smtClean="0"/>
-              <a:t>Требования спецификации можно </a:t>
-            </a:r>
-            <a:r>
-              <a:rPr lang="ru-RU" sz="2595" dirty="0" smtClean="0"/>
-              <a:t>добавить в модель несколькими способами</a:t>
+              <a:t>Требования спецификации можно добавить в модель несколькими способами</a:t>
             </a:r>
             <a:r>
               <a:rPr lang="en-US" sz="2595" dirty="0" smtClean="0"/>
               <a:t>:</a:t>
             </a:r>
+            <a:endParaRPr lang="en-US" sz="2595" dirty="0" smtClean="0"/>
           </a:p>
           <a:p>
             <a:pPr lvl="1"/>
             <a:r>
               <a:rPr lang="ru-RU" sz="2195" dirty="0" smtClean="0"/>
-              <a:t>Создать новое состояние (</a:t>
+              <a:t>с</a:t>
             </a:r>
             <a:r>
               <a:rPr lang="ru-RU" sz="2195" dirty="0" smtClean="0"/>
-              <a:t>ошибка) </a:t>
+              <a:t>оздать </a:t>
             </a:r>
             <a:r>
               <a:rPr lang="ru-RU" sz="2195" dirty="0" smtClean="0"/>
-              <a:t>и добавить переход с охранным условием. Это приведет к большому количеству </a:t>
+              <a:t>новое состояние (ошибка) и добавить переход с охранным условием. Это приведет к большому количеству </a:t>
             </a:r>
             <a:r>
               <a:rPr lang="ru-RU" sz="2195" dirty="0" smtClean="0"/>
-              <a:t>состояний.</a:t>
+              <a:t>состояний</a:t>
+            </a:r>
+            <a:r>
+              <a:rPr lang="en-US" sz="2195" dirty="0" smtClean="0"/>
+              <a:t>;</a:t>
             </a:r>
             <a:endParaRPr lang="ru-RU" sz="2195" dirty="0" smtClean="0"/>
           </a:p>
@@ -4505,13 +4744,16 @@
             <a:pPr lvl="1"/>
             <a:r>
               <a:rPr lang="ru-RU" sz="2195" dirty="0" smtClean="0"/>
-              <a:t>Записать требование при помощи контракта к действию на переходе, на котором выполняется обращение к объекту </a:t>
+              <a:t>з</a:t>
             </a:r>
             <a:r>
               <a:rPr lang="ru-RU" sz="2195" dirty="0" smtClean="0"/>
-              <a:t>управления, или состоянию автомата.</a:t>
-            </a:r>
-            <a:endParaRPr lang="ru-RU" sz="2195" dirty="0" smtClean="0"/>
+              <a:t>аписать </a:t>
+            </a:r>
+            <a:r>
+              <a:rPr lang="ru-RU" sz="2195" dirty="0" smtClean="0"/>
+              <a:t>требование при помощи контракта к действию на переходе, на котором выполняется обращение к объекту управления, или состоянию автомата.</a:t>
+            </a:r>
           </a:p>
           <a:p>
             <a:pPr lvl="0"/>
@@ -4536,54 +4778,40 @@
           <a:p>
             <a:pPr lvl="1"/>
             <a:r>
-              <a:rPr lang="en-US" sz="2195" dirty="0" smtClean="0"/>
+              <a:rPr lang="en-US" sz="2195" dirty="0" smtClean="0">
+                <a:latin typeface="Courier"/>
+                <a:cs typeface="Courier"/>
+              </a:rPr>
               <a:t>@ensures </a:t>
             </a:r>
             <a:r>
-              <a:rPr lang="en-US" sz="2195" dirty="0" err="1" smtClean="0"/>
-              <a:t>ext_</a:t>
-            </a:r>
-            <a:r>
-              <a:rPr lang="en-US" sz="2195" dirty="0" err="1" smtClean="0"/>
-              <a:t>x</a:t>
-            </a:r>
-            <a:r>
-              <a:rPr lang="en-US" sz="2195" dirty="0" smtClean="0"/>
-              <a:t> </a:t>
-            </a:r>
-            <a:r>
-              <a:rPr lang="en-US" sz="2195" dirty="0" smtClean="0"/>
-              <a:t>&gt;=</a:t>
-            </a:r>
-            <a:r>
-              <a:rPr lang="en-US" sz="2195" dirty="0" smtClean="0"/>
-              <a:t> 1000 </a:t>
-            </a:r>
-            <a:r>
-              <a:rPr lang="en-US" sz="2195" dirty="0" smtClean="0"/>
-              <a:t>&amp;&amp; </a:t>
-            </a:r>
-            <a:r>
-              <a:rPr lang="en-US" sz="2195" dirty="0" err="1" smtClean="0"/>
+              <a:rPr lang="en-US" sz="2195" dirty="0" err="1" smtClean="0">
+                <a:latin typeface="Courier"/>
+                <a:cs typeface="Courier"/>
+              </a:rPr>
               <a:t>ext_x</a:t>
             </a:r>
             <a:r>
-              <a:rPr lang="en-US" sz="2195" dirty="0" smtClean="0"/>
-              <a:t> </a:t>
-            </a:r>
-            <a:r>
-              <a:rPr lang="en-US" sz="2195" dirty="0" smtClean="0"/>
-              <a:t>&lt;=</a:t>
-            </a:r>
-            <a:r>
-              <a:rPr lang="en-US" sz="2195" dirty="0" smtClean="0"/>
-              <a:t> </a:t>
-            </a:r>
-            <a:r>
-              <a:rPr lang="en-US" sz="2195" dirty="0" smtClean="0"/>
-              <a:t>15000</a:t>
-            </a:r>
-            <a:endParaRPr lang="en-US" sz="2195" dirty="0" smtClean="0"/>
+              <a:rPr lang="en-US" sz="2195" dirty="0" smtClean="0">
+                <a:latin typeface="Courier"/>
+                <a:cs typeface="Courier"/>
+              </a:rPr>
+              <a:t> &gt;= 1000 &amp;&amp; </a:t>
+            </a:r>
+            <a:r>
+              <a:rPr lang="en-US" sz="2195" dirty="0" err="1" smtClean="0">
+                <a:latin typeface="Courier"/>
+                <a:cs typeface="Courier"/>
+              </a:rPr>
+              <a:t>ext_x</a:t>
+            </a:r>
+            <a:r>
+              <a:rPr lang="en-US" sz="2195" dirty="0" smtClean="0">
+                <a:latin typeface="Courier"/>
+                <a:cs typeface="Courier"/>
+              </a:rPr>
+              <a:t> &lt;= 15000</a:t>
+            </a:r>
           </a:p>
           <a:p>
             <a:r>
@@ -4684,6 +4912,30 @@
           <a:chExt cx="0" cy="0"/>
         </a:xfrm>
       </p:grpSpPr>
+      <p:pic>
+        <p:nvPicPr>
+          <p:cNvPr id="5" name="Picture 4" descr="all-spec.png"/>
+          <p:cNvPicPr>
+            <a:picLocks noChangeAspect="1"/>
+          </p:cNvPicPr>
+          <p:nvPr/>
+        </p:nvPicPr>
+        <p:blipFill>
+          <a:blip r:embed="rId2"/>
+          <a:stretch>
+            <a:fillRect/>
+          </a:stretch>
+        </p:blipFill>
+        <p:spPr>
+          <a:xfrm>
+            <a:off x="3048000" y="2235200"/>
+            <a:ext cx="6096000" cy="4318000"/>
+          </a:xfrm>
+          <a:prstGeom prst="rect">
+            <a:avLst/>
+          </a:prstGeom>
+        </p:spPr>
+      </p:pic>
       <p:sp>
         <p:nvSpPr>
           <p:cNvPr id="2" name="Title 1"/>
@@ -4743,12 +4995,257 @@
             <a:pPr lvl="0"/>
             <a:r>
               <a:rPr lang="ru-RU" sz="2595" dirty="0" smtClean="0"/>
-              <a:t>В рассмотреном примере требование только одно и записано как постусловие к переходу </a:t>
+              <a:t>Добавляем требования в модель при помощи контрактов</a:t>
             </a:r>
             <a:r>
               <a:rPr lang="en-US" sz="2595" dirty="0" smtClean="0"/>
-              <a:t>t2:</a:t>
-            </a:r>
+              <a:t>.</a:t>
+            </a:r>
+          </a:p>
+          <a:p>
+            <a:pPr lvl="0"/>
+            <a:r>
+              <a:rPr lang="ru-RU" sz="2000" dirty="0" smtClean="0"/>
+              <a:t>Клавиатура</a:t>
+            </a:r>
+            <a:r>
+              <a:rPr lang="en-US" sz="2000" dirty="0" smtClean="0"/>
+              <a:t>:</a:t>
+            </a:r>
+          </a:p>
+          <a:p>
+            <a:pPr lvl="1"/>
+            <a:r>
+              <a:rPr lang="en-US" sz="1800" dirty="0" smtClean="0">
+                <a:latin typeface="Courier"/>
+                <a:cs typeface="Courier"/>
+              </a:rPr>
+              <a:t>@ensures </a:t>
+            </a:r>
+            <a:r>
+              <a:rPr lang="en-US" sz="1800" dirty="0" err="1" smtClean="0">
+                <a:latin typeface="Courier"/>
+                <a:cs typeface="Courier"/>
+              </a:rPr>
+              <a:t>ext_x</a:t>
+            </a:r>
+            <a:r>
+              <a:rPr lang="en-US" sz="1800" dirty="0" smtClean="0">
+                <a:latin typeface="Courier"/>
+                <a:cs typeface="Courier"/>
+              </a:rPr>
+              <a:t> &gt;= 1000</a:t>
+            </a:r>
+            <a:r>
+              <a:rPr lang="en-US" sz="1800" dirty="0" smtClean="0">
+                <a:latin typeface="Courier"/>
+                <a:cs typeface="Courier"/>
+              </a:rPr>
+              <a:t> </a:t>
+            </a:r>
+            <a:br>
+              <a:rPr lang="en-US" sz="1800" dirty="0" smtClean="0">
+                <a:latin typeface="Courier"/>
+                <a:cs typeface="Courier"/>
+              </a:rPr>
+            </a:br>
+            <a:r>
+              <a:rPr lang="en-US" sz="1800" dirty="0" smtClean="0">
+                <a:latin typeface="Courier"/>
+                <a:cs typeface="Courier"/>
+              </a:rPr>
+              <a:t>&amp;</a:t>
+            </a:r>
+            <a:r>
+              <a:rPr lang="en-US" sz="1800" dirty="0" smtClean="0">
+                <a:latin typeface="Courier"/>
+                <a:cs typeface="Courier"/>
+              </a:rPr>
+              <a:t>&amp; </a:t>
+            </a:r>
+            <a:r>
+              <a:rPr lang="en-US" sz="1800" dirty="0" err="1" smtClean="0">
+                <a:latin typeface="Courier"/>
+                <a:cs typeface="Courier"/>
+              </a:rPr>
+              <a:t>ext_x</a:t>
+            </a:r>
+            <a:r>
+              <a:rPr lang="en-US" sz="1800" dirty="0" smtClean="0">
+                <a:latin typeface="Courier"/>
+                <a:cs typeface="Courier"/>
+              </a:rPr>
+              <a:t> &lt;= </a:t>
+            </a:r>
+            <a:r>
+              <a:rPr lang="en-US" sz="1800" dirty="0" smtClean="0">
+                <a:latin typeface="Courier"/>
+                <a:cs typeface="Courier"/>
+              </a:rPr>
+              <a:t>15000</a:t>
+            </a:r>
+          </a:p>
+          <a:p>
+            <a:pPr lvl="0"/>
+            <a:r>
+              <a:rPr lang="ru-RU" sz="2000" dirty="0" smtClean="0"/>
+              <a:t>Счет</a:t>
+            </a:r>
+            <a:r>
+              <a:rPr lang="en-US" sz="2000" dirty="0" smtClean="0"/>
+              <a:t>:</a:t>
+            </a:r>
+            <a:endParaRPr lang="en-US" sz="2000" dirty="0" smtClean="0"/>
+          </a:p>
+          <a:p>
+            <a:pPr lvl="1"/>
+            <a:r>
+              <a:rPr lang="en-US" sz="1800" dirty="0" smtClean="0">
+                <a:latin typeface="Courier"/>
+                <a:cs typeface="Courier"/>
+              </a:rPr>
+              <a:t>@ensures </a:t>
+            </a:r>
+            <a:r>
+              <a:rPr lang="en-US" sz="1800" dirty="0" err="1" smtClean="0">
+                <a:latin typeface="Courier"/>
+                <a:cs typeface="Courier"/>
+              </a:rPr>
+              <a:t>ext_sum</a:t>
+            </a:r>
+            <a:r>
+              <a:rPr lang="en-US" sz="1800" dirty="0" smtClean="0">
+                <a:latin typeface="Courier"/>
+                <a:cs typeface="Courier"/>
+              </a:rPr>
+              <a:t> </a:t>
+            </a:r>
+            <a:r>
+              <a:rPr lang="en-US" sz="1800" dirty="0" smtClean="0">
+                <a:latin typeface="Courier"/>
+                <a:cs typeface="Courier"/>
+              </a:rPr>
+              <a:t>&gt;=</a:t>
+            </a:r>
+            <a:r>
+              <a:rPr lang="en-US" sz="1800" dirty="0" smtClean="0">
+                <a:latin typeface="Courier"/>
+                <a:cs typeface="Courier"/>
+              </a:rPr>
+              <a:t> 0 </a:t>
+            </a:r>
+            <a:r>
+              <a:rPr lang="en-US" sz="1800" dirty="0" smtClean="0">
+                <a:latin typeface="Courier"/>
+                <a:cs typeface="Courier"/>
+              </a:rPr>
+              <a:t/>
+            </a:r>
+            <a:br>
+              <a:rPr lang="en-US" sz="1800" dirty="0" smtClean="0">
+                <a:latin typeface="Courier"/>
+                <a:cs typeface="Courier"/>
+              </a:rPr>
+            </a:br>
+            <a:r>
+              <a:rPr lang="en-US" sz="1800" dirty="0" smtClean="0">
+                <a:latin typeface="Courier"/>
+                <a:cs typeface="Courier"/>
+              </a:rPr>
+              <a:t>&amp;&amp; </a:t>
+            </a:r>
+            <a:r>
+              <a:rPr lang="en-US" sz="1800" dirty="0" err="1" smtClean="0">
+                <a:latin typeface="Courier"/>
+                <a:cs typeface="Courier"/>
+              </a:rPr>
+              <a:t>ext_sum</a:t>
+            </a:r>
+            <a:r>
+              <a:rPr lang="en-US" sz="1800" dirty="0" smtClean="0">
+                <a:latin typeface="Courier"/>
+                <a:cs typeface="Courier"/>
+              </a:rPr>
+              <a:t> </a:t>
+            </a:r>
+            <a:r>
+              <a:rPr lang="en-US" sz="1800" dirty="0" smtClean="0">
+                <a:latin typeface="Courier"/>
+                <a:cs typeface="Courier"/>
+              </a:rPr>
+              <a:t>&lt;= </a:t>
+            </a:r>
+            <a:r>
+              <a:rPr lang="en-US" sz="1800" dirty="0" smtClean="0">
+                <a:latin typeface="Courier"/>
+                <a:cs typeface="Courier"/>
+              </a:rPr>
+              <a:t>100000</a:t>
+            </a:r>
+          </a:p>
+          <a:p>
+            <a:pPr lvl="0"/>
+            <a:endParaRPr lang="ru-RU" sz="2000" dirty="0" smtClean="0"/>
+          </a:p>
+          <a:p>
+            <a:pPr lvl="0">
+              <a:buNone/>
+            </a:pPr>
+            <a:endParaRPr lang="en-US" sz="2000" dirty="0" smtClean="0"/>
+          </a:p>
+          <a:p>
+            <a:pPr lvl="0"/>
+            <a:r>
+              <a:rPr lang="ru-RU" sz="2000" dirty="0" smtClean="0"/>
+              <a:t>Автомат</a:t>
+            </a:r>
+            <a:r>
+              <a:rPr lang="en-US" sz="2000" dirty="0" smtClean="0"/>
+              <a:t>:</a:t>
+            </a:r>
+            <a:endParaRPr lang="en-US" sz="2000" dirty="0" smtClean="0"/>
+          </a:p>
+          <a:p>
+            <a:pPr lvl="1"/>
+            <a:r>
+              <a:rPr lang="en-US" sz="1800" dirty="0" smtClean="0">
+                <a:latin typeface="Courier"/>
+                <a:cs typeface="Courier"/>
+              </a:rPr>
+              <a:t>@invariant today </a:t>
+            </a:r>
+            <a:r>
+              <a:rPr lang="en-US" sz="1800" dirty="0" smtClean="0">
+                <a:latin typeface="Courier"/>
+                <a:cs typeface="Courier"/>
+              </a:rPr>
+              <a:t>&lt;=</a:t>
+            </a:r>
+            <a:r>
+              <a:rPr lang="en-US" sz="1800" dirty="0" smtClean="0">
+                <a:latin typeface="Courier"/>
+                <a:cs typeface="Courier"/>
+              </a:rPr>
+              <a:t> 50</a:t>
+            </a:r>
+            <a:r>
+              <a:rPr lang="ru-RU" sz="1800" dirty="0" smtClean="0">
+                <a:latin typeface="Courier"/>
+                <a:cs typeface="Courier"/>
+              </a:rPr>
+              <a:t>0</a:t>
+            </a:r>
+            <a:r>
+              <a:rPr lang="en-US" sz="1800" dirty="0" smtClean="0">
+                <a:latin typeface="Courier"/>
+                <a:cs typeface="Courier"/>
+              </a:rPr>
+              <a:t>00</a:t>
+            </a:r>
+            <a:endParaRPr lang="en-US" sz="1800" dirty="0" smtClean="0">
+              <a:latin typeface="Courier"/>
+              <a:cs typeface="Courier"/>
+            </a:endParaRPr>
           </a:p>
           <a:p>
             <a:pPr lvl="0"/>
@@ -4760,10 +5257,13 @@
           </a:p>
           <a:p>
             <a:pPr lvl="0"/>
-            <a:r>
-              <a:rPr lang="ru-RU" sz="2595" dirty="0" smtClean="0"/>
-              <a:t>картинка</a:t>
-            </a:r>
+            <a:endParaRPr lang="en-US" sz="2595" dirty="0" smtClean="0"/>
+          </a:p>
+          <a:p>
+            <a:pPr lvl="0">
+              <a:buNone/>
+            </a:pPr>
+            <a:endParaRPr lang="ru-RU" sz="2595" dirty="0" smtClean="0"/>
           </a:p>
           <a:p>
             <a:pPr lvl="0"/>
@@ -4876,11 +5376,7 @@
             </a:r>
             <a:r>
               <a:rPr lang="en-US" sz="3600" dirty="0" smtClean="0"/>
-              <a:t>:</a:t>
-            </a:r>
-            <a:r>
-              <a:rPr lang="en-US" sz="3600" dirty="0" smtClean="0"/>
-              <a:t> </a:t>
+              <a:t>: </a:t>
             </a:r>
             <a:r>
               <a:rPr lang="ru-RU" sz="3600" dirty="0" smtClean="0"/>
@@ -5368,11 +5864,7 @@
           <a:p>
             <a:r>
               <a:rPr lang="ru-RU" dirty="0" smtClean="0"/>
-              <a:t>Определим тестовый сценарий, как последовательность переходов в </a:t>
-            </a:r>
-            <a:r>
-              <a:rPr lang="ru-RU" dirty="0" smtClean="0"/>
-              <a:t>автомате</a:t>
+              <a:t>Определим тестовый сценарий, как последовательность переходов в автомате</a:t>
             </a:r>
             <a:r>
               <a:rPr lang="en-US" dirty="0" smtClean="0"/>
@@ -5384,11 +5876,7 @@
             <a:pPr lvl="1"/>
             <a:r>
               <a:rPr lang="ru-RU" dirty="0" smtClean="0"/>
-              <a:t>Словесное описание легко записать в терминах переходов между </a:t>
-            </a:r>
-            <a:r>
-              <a:rPr lang="ru-RU" dirty="0" smtClean="0"/>
-              <a:t>состояниями</a:t>
+              <a:t>Словесное описание легко записать в терминах переходов между состояниями</a:t>
             </a:r>
             <a:r>
               <a:rPr lang="en-US" dirty="0" smtClean="0"/>
@@ -5400,11 +5888,7 @@
             <a:pPr lvl="1"/>
             <a:r>
               <a:rPr lang="ru-RU" dirty="0" smtClean="0"/>
-              <a:t>Имея описание в виде последовательности переходов легко соотнести со словесной спецификацией и понять смысл </a:t>
-            </a:r>
-            <a:r>
-              <a:rPr lang="ru-RU" dirty="0" smtClean="0"/>
-              <a:t>теста</a:t>
+              <a:t>Имея описание в виде последовательности переходов легко соотнести со словесной спецификацией и понять смысл теста</a:t>
             </a:r>
             <a:r>
               <a:rPr lang="en-US" dirty="0" smtClean="0"/>
@@ -5594,7 +6078,11 @@
             <a:pPr lvl="1"/>
             <a:r>
               <a:rPr lang="ru-RU" dirty="0" smtClean="0"/>
-              <a:t>выполнить все охранные условияи предусловия на переходах</a:t>
+              <a:t>выполнить все охранные </a:t>
+            </a:r>
+            <a:r>
+              <a:rPr lang="ru-RU" dirty="0" smtClean="0"/>
+              <a:t>условия и контракты ОУ</a:t>
             </a:r>
             <a:r>
               <a:rPr lang="en-US" dirty="0" smtClean="0"/>
@@ -5605,7 +6093,15 @@
           <a:p>
             <a:r>
               <a:rPr lang="ru-RU" dirty="0" smtClean="0"/>
-              <a:t>В охранных условиях и контрактах задействованы переменные, которые автомат получает из среды при помощи объектов управления </a:t>
+              <a:t>В</a:t>
+            </a:r>
+            <a:r>
+              <a:rPr lang="ru-RU" dirty="0" smtClean="0"/>
+              <a:t> условиях задействованы </a:t>
+            </a:r>
+            <a:r>
+              <a:rPr lang="ru-RU" dirty="0" smtClean="0"/>
+              <a:t>переменные, которые автомат получает из среды при помощи объектов управления </a:t>
             </a:r>
           </a:p>
           <a:p>
@@ -5677,11 +6173,7 @@
           <a:p>
             <a:r>
               <a:rPr lang="ru-RU" dirty="0" smtClean="0"/>
-              <a:t>В данной работе предложен способ автоматизации поиска </a:t>
-            </a:r>
-            <a:r>
-              <a:rPr lang="ru-RU" dirty="0" smtClean="0"/>
-              <a:t>значений</a:t>
+              <a:t>В данной работе предложен способ автоматизации поиска значений</a:t>
             </a:r>
             <a:r>
               <a:rPr lang="en-US" dirty="0" smtClean="0"/>
@@ -5689,15 +6181,7 @@
             </a:r>
             <a:r>
               <a:rPr lang="ru-RU" dirty="0" smtClean="0"/>
-              <a:t>внешних переменных</a:t>
-            </a:r>
-            <a:r>
-              <a:rPr lang="ru-RU" dirty="0" smtClean="0"/>
-              <a:t>, </a:t>
-            </a:r>
-            <a:r>
-              <a:rPr lang="ru-RU" dirty="0" smtClean="0"/>
-              <a:t>при которых выполняются охранные условия и контракты объектов управления.  </a:t>
+              <a:t>внешних переменных, при которых выполняются охранные условия и контракты объектов управления.  </a:t>
             </a:r>
           </a:p>
         </p:txBody>
@@ -5808,13 +6292,17 @@
         </p:spPr>
         <p:txBody>
           <a:bodyPr>
-            <a:normAutofit fontScale="70000" lnSpcReduction="20000"/>
+            <a:normAutofit fontScale="77500" lnSpcReduction="20000"/>
           </a:bodyPr>
           <a:lstStyle/>
           <a:p>
             <a:r>
               <a:rPr lang="ru-RU" dirty="0" smtClean="0"/>
-              <a:t>Необходимо найти набор чисел, который удовлетворит всем охранным условиям и контрактам объектов управления</a:t>
+              <a:t>Для поиска значений </a:t>
+            </a:r>
+            <a:r>
+              <a:rPr lang="ru-RU" dirty="0" smtClean="0"/>
+              <a:t>используется генетический алгоритм</a:t>
             </a:r>
             <a:r>
               <a:rPr lang="en-US" dirty="0" smtClean="0"/>
@@ -5825,18 +6313,15 @@
           <a:p>
             <a:r>
               <a:rPr lang="ru-RU" dirty="0" smtClean="0"/>
-              <a:t>Для этого используется генетический алгоритм</a:t>
-            </a:r>
-            <a:r>
-              <a:rPr lang="en-US" dirty="0" smtClean="0"/>
-              <a:t>.</a:t>
-            </a:r>
-            <a:endParaRPr lang="ru-RU" dirty="0" smtClean="0"/>
-          </a:p>
-          <a:p>
-            <a:r>
-              <a:rPr lang="ru-RU" dirty="0" smtClean="0"/>
-              <a:t>Фитнес-функция берет на вход набор значений для внешних переменных и оценивает для заданной последовательности переходов</a:t>
+              <a:t>Фитнес-функция берет на вход набор значений для внешних переменных и оценивает</a:t>
+            </a:r>
+            <a:r>
+              <a:rPr lang="ru-RU" dirty="0" smtClean="0"/>
+              <a:t> приспособленность для </a:t>
+            </a:r>
+            <a:r>
+              <a:rPr lang="ru-RU" dirty="0" smtClean="0"/>
+              <a:t>заданной последовательности переходов</a:t>
             </a:r>
             <a:r>
               <a:rPr lang="en-US" dirty="0" smtClean="0"/>
@@ -5847,7 +6332,15 @@
             <a:pPr lvl="1"/>
             <a:r>
               <a:rPr lang="ru-RU" dirty="0" smtClean="0"/>
-              <a:t>сколько переходов выполненно успешно (выполненны все условия)</a:t>
+              <a:t>сколько переходов выполненно успешно (</a:t>
+            </a:r>
+            <a:r>
+              <a:rPr lang="ru-RU" dirty="0" smtClean="0"/>
+              <a:t>выполнены </a:t>
+            </a:r>
+            <a:r>
+              <a:rPr lang="ru-RU" dirty="0" smtClean="0"/>
+              <a:t>все условия)</a:t>
             </a:r>
             <a:r>
               <a:rPr lang="en-US" dirty="0" smtClean="0"/>
@@ -5862,11 +6355,7 @@
             <a:pPr lvl="1"/>
             <a:r>
               <a:rPr lang="ru-RU" dirty="0" smtClean="0"/>
-              <a:t>для всех невыполненных условий учитывается насколько сильно нарушено это </a:t>
-            </a:r>
-            <a:r>
-              <a:rPr lang="ru-RU" dirty="0" smtClean="0"/>
-              <a:t>условие (</a:t>
+              <a:t>для всех невыполненных условий учитывается насколько сильно нарушено это условие (</a:t>
             </a:r>
             <a:r>
               <a:rPr lang="en-US" i="1" dirty="0" smtClean="0"/>
@@ -5874,15 +6363,7 @@
             </a:r>
             <a:r>
               <a:rPr lang="ru-RU" dirty="0" smtClean="0"/>
-              <a:t>) </a:t>
-            </a:r>
-            <a:r>
-              <a:rPr lang="ru-RU" dirty="0" smtClean="0"/>
-              <a:t>и положение этого условия в заданном </a:t>
-            </a:r>
-            <a:r>
-              <a:rPr lang="ru-RU" dirty="0" smtClean="0"/>
-              <a:t>пути</a:t>
+              <a:t>) и положение этого условия в заданном пути</a:t>
             </a:r>
             <a:r>
               <a:rPr lang="en-US" dirty="0" smtClean="0"/>
@@ -5892,7 +6373,6 @@
               <a:rPr lang="ru-RU" dirty="0" smtClean="0"/>
               <a:t> </a:t>
             </a:r>
-            <a:endParaRPr lang="ru-RU" dirty="0" smtClean="0"/>
           </a:p>
           <a:p>
             <a:pPr lvl="1"/>
@@ -6007,15 +6487,7 @@
             </a:r>
             <a:r>
               <a:rPr lang="ru-RU" dirty="0" smtClean="0"/>
-              <a:t> </a:t>
-            </a:r>
-            <a:r>
-              <a:rPr lang="ru-RU" dirty="0" smtClean="0"/>
-              <a:t>Генетический </a:t>
-            </a:r>
-            <a:r>
-              <a:rPr lang="ru-RU" dirty="0" smtClean="0"/>
-              <a:t>алгоритм</a:t>
+              <a:t> Генетический алгоритм</a:t>
             </a:r>
             <a:endParaRPr lang="en-US" dirty="0"/>
           </a:p>
@@ -6045,11 +6517,7 @@
           <a:p>
             <a:r>
               <a:rPr lang="ru-RU" dirty="0" smtClean="0"/>
-              <a:t>Набор внешних </a:t>
-            </a:r>
-            <a:r>
-              <a:rPr lang="ru-RU" dirty="0" smtClean="0"/>
-              <a:t>переменных </a:t>
+              <a:t>Набор внешних переменных </a:t>
             </a:r>
             <a:r>
               <a:rPr lang="en-US" dirty="0" smtClean="0"/>
@@ -6079,21 +6547,7 @@
                 <a:latin typeface="Courier"/>
                 <a:cs typeface="Courier"/>
               </a:rPr>
-              <a:t>&lt;</a:t>
-            </a:r>
-            <a:r>
-              <a:rPr lang="ru-RU" dirty="0" smtClean="0">
-                <a:latin typeface="Courier"/>
-                <a:cs typeface="Courier"/>
-              </a:rPr>
-              <a:t>x1, x2, …, xn</a:t>
-            </a:r>
-            <a:r>
-              <a:rPr lang="ru-RU" dirty="0" smtClean="0">
-                <a:latin typeface="Courier"/>
-                <a:cs typeface="Courier"/>
-              </a:rPr>
-              <a:t>&gt;</a:t>
+              <a:t>&lt;x1, x2, …, xn&gt;</a:t>
             </a:r>
             <a:endParaRPr lang="en-US" dirty="0" smtClean="0">
               <a:latin typeface="Courier"/>
@@ -6279,152 +6733,110 @@
                 <a:latin typeface="Courier"/>
                 <a:cs typeface="Courier"/>
               </a:rPr>
-              <a:t>,</a:t>
+              <a:t>, </a:t>
+            </a:r>
+            <a:r>
+              <a:rPr lang="en-US" dirty="0" smtClean="0">
+                <a:latin typeface="Courier"/>
+                <a:cs typeface="Courier"/>
+              </a:rPr>
+              <a:t>y4&gt;</a:t>
+            </a:r>
+          </a:p>
+          <a:p>
+            <a:pPr marL="342900" lvl="1" indent="-342900">
+              <a:buNone/>
+            </a:pPr>
+            <a:r>
+              <a:rPr lang="en-US" dirty="0" smtClean="0">
+                <a:latin typeface="Courier"/>
+                <a:cs typeface="Courier"/>
+              </a:rPr>
+              <a:t>			&lt;y</a:t>
             </a:r>
             <a:r>
               <a:rPr lang="ru-RU" dirty="0" smtClean="0">
                 <a:latin typeface="Courier"/>
                 <a:cs typeface="Courier"/>
               </a:rPr>
-              <a:t> </a:t>
+              <a:t>1, </a:t>
+            </a:r>
+            <a:r>
+              <a:rPr lang="en-US" dirty="0" err="1" smtClean="0">
+                <a:latin typeface="Courier"/>
+                <a:cs typeface="Courier"/>
+              </a:rPr>
+              <a:t>y</a:t>
+            </a:r>
+            <a:r>
+              <a:rPr lang="ru-RU" dirty="0" smtClean="0">
+                <a:latin typeface="Courier"/>
+                <a:cs typeface="Courier"/>
+              </a:rPr>
+              <a:t>2,</a:t>
             </a:r>
             <a:r>
               <a:rPr lang="en-US" dirty="0" smtClean="0">
                 <a:latin typeface="Courier"/>
                 <a:cs typeface="Courier"/>
               </a:rPr>
-              <a:t>y4&gt;</a:t>
-            </a:r>
-          </a:p>
-          <a:p>
-            <a:pPr marL="342900" lvl="1" indent="-342900">
-              <a:buNone/>
-            </a:pPr>
+              <a:t> y3</a:t>
+            </a:r>
+            <a:r>
+              <a:rPr lang="ru-RU" dirty="0" smtClean="0">
+                <a:latin typeface="Courier"/>
+                <a:cs typeface="Courier"/>
+              </a:rPr>
+              <a:t>, </a:t>
+            </a:r>
             <a:r>
               <a:rPr lang="en-US" dirty="0" smtClean="0">
                 <a:latin typeface="Courier"/>
                 <a:cs typeface="Courier"/>
               </a:rPr>
-              <a:t>			&lt;</a:t>
+              <a:t>y4&gt;         &lt;</a:t>
+            </a:r>
+            <a:r>
+              <a:rPr lang="en-US" dirty="0" err="1" smtClean="0">
+                <a:latin typeface="Courier"/>
+                <a:cs typeface="Courier"/>
+              </a:rPr>
+              <a:t>y</a:t>
+            </a:r>
+            <a:r>
+              <a:rPr lang="ru-RU" dirty="0" smtClean="0">
+                <a:latin typeface="Courier"/>
+                <a:cs typeface="Courier"/>
+              </a:rPr>
+              <a:t>1, </a:t>
+            </a:r>
+            <a:r>
+              <a:rPr lang="en-US" dirty="0" err="1" smtClean="0">
+                <a:latin typeface="Courier"/>
+                <a:cs typeface="Courier"/>
+              </a:rPr>
+              <a:t>y</a:t>
+            </a:r>
+            <a:r>
+              <a:rPr lang="ru-RU" dirty="0" smtClean="0">
+                <a:latin typeface="Courier"/>
+                <a:cs typeface="Courier"/>
+              </a:rPr>
+              <a:t>2,</a:t>
             </a:r>
             <a:r>
               <a:rPr lang="en-US" dirty="0" smtClean="0">
                 <a:latin typeface="Courier"/>
                 <a:cs typeface="Courier"/>
               </a:rPr>
-              <a:t>y</a:t>
+              <a:t> y3</a:t>
             </a:r>
             <a:r>
               <a:rPr lang="ru-RU" dirty="0" smtClean="0">
                 <a:latin typeface="Courier"/>
                 <a:cs typeface="Courier"/>
               </a:rPr>
-              <a:t>1</a:t>
-            </a:r>
-            <a:r>
-              <a:rPr lang="ru-RU" dirty="0" smtClean="0">
-                <a:latin typeface="Courier"/>
-                <a:cs typeface="Courier"/>
-              </a:rPr>
-              <a:t>,</a:t>
-            </a:r>
-            <a:r>
-              <a:rPr lang="ru-RU" dirty="0" smtClean="0">
-                <a:latin typeface="Courier"/>
-                <a:cs typeface="Courier"/>
-              </a:rPr>
-              <a:t> </a:t>
-            </a:r>
-            <a:r>
-              <a:rPr lang="en-US" dirty="0" err="1" smtClean="0">
-                <a:latin typeface="Courier"/>
-                <a:cs typeface="Courier"/>
-              </a:rPr>
-              <a:t>y</a:t>
-            </a:r>
-            <a:r>
-              <a:rPr lang="ru-RU" dirty="0" smtClean="0">
-                <a:latin typeface="Courier"/>
-                <a:cs typeface="Courier"/>
-              </a:rPr>
-              <a:t>2,</a:t>
-            </a:r>
-            <a:r>
-              <a:rPr lang="en-US" dirty="0" smtClean="0">
-                <a:latin typeface="Courier"/>
-                <a:cs typeface="Courier"/>
-              </a:rPr>
-              <a:t> y3</a:t>
-            </a:r>
-            <a:r>
-              <a:rPr lang="ru-RU" dirty="0" smtClean="0">
-                <a:latin typeface="Courier"/>
-                <a:cs typeface="Courier"/>
-              </a:rPr>
               <a:t>, </a:t>
-            </a:r>
-            <a:r>
-              <a:rPr lang="en-US" dirty="0" smtClean="0">
-                <a:latin typeface="Courier"/>
-                <a:cs typeface="Courier"/>
-              </a:rPr>
-              <a:t>y4&gt;         </a:t>
-            </a:r>
-            <a:r>
-              <a:rPr lang="en-US" dirty="0" smtClean="0">
-                <a:latin typeface="Courier"/>
-                <a:cs typeface="Courier"/>
-              </a:rPr>
-              <a:t>&lt;</a:t>
-            </a:r>
-            <a:r>
-              <a:rPr lang="en-US" dirty="0" err="1" smtClean="0">
-                <a:latin typeface="Courier"/>
-                <a:cs typeface="Courier"/>
-              </a:rPr>
-              <a:t>y</a:t>
-            </a:r>
-            <a:r>
-              <a:rPr lang="ru-RU" dirty="0" smtClean="0">
-                <a:latin typeface="Courier"/>
-                <a:cs typeface="Courier"/>
-              </a:rPr>
-              <a:t>1, </a:t>
-            </a:r>
-            <a:r>
-              <a:rPr lang="en-US" dirty="0" err="1" smtClean="0">
-                <a:latin typeface="Courier"/>
-                <a:cs typeface="Courier"/>
-              </a:rPr>
-              <a:t>y</a:t>
-            </a:r>
-            <a:r>
-              <a:rPr lang="ru-RU" dirty="0" smtClean="0">
-                <a:latin typeface="Courier"/>
-                <a:cs typeface="Courier"/>
-              </a:rPr>
-              <a:t>2,</a:t>
-            </a:r>
-            <a:r>
-              <a:rPr lang="en-US" dirty="0" smtClean="0">
-                <a:latin typeface="Courier"/>
-                <a:cs typeface="Courier"/>
-              </a:rPr>
-              <a:t> y3</a:t>
-            </a:r>
-            <a:r>
-              <a:rPr lang="ru-RU" dirty="0" smtClean="0">
-                <a:latin typeface="Courier"/>
-                <a:cs typeface="Courier"/>
-              </a:rPr>
-              <a:t>,</a:t>
-            </a:r>
-            <a:r>
-              <a:rPr lang="ru-RU" dirty="0" smtClean="0">
-                <a:latin typeface="Courier"/>
-                <a:cs typeface="Courier"/>
-              </a:rPr>
-              <a:t> </a:t>
             </a:r>
             <a:r>
               <a:rPr lang="en-US" b="1" dirty="0" smtClean="0">
@@ -6455,11 +6867,7 @@
           <a:p>
             <a:r>
               <a:rPr lang="ru-RU" dirty="0" smtClean="0"/>
-              <a:t>Фитнес-</a:t>
-            </a:r>
-            <a:r>
-              <a:rPr lang="ru-RU" dirty="0" smtClean="0"/>
-              <a:t>функция</a:t>
+              <a:t>Фитнес-функция</a:t>
             </a:r>
             <a:r>
               <a:rPr lang="en-US" dirty="0" smtClean="0"/>
@@ -6481,17 +6889,14 @@
           <a:p>
             <a:pPr lvl="1"/>
             <a:r>
-              <a:rPr lang="ru-RU" dirty="0" smtClean="0"/>
+              <a:rPr lang="ru-RU" i="1" dirty="0" smtClean="0"/>
               <a:t>расстояние до условия</a:t>
             </a:r>
             <a:r>
-              <a:rPr lang="en-US" dirty="0" smtClean="0"/>
+              <a:rPr lang="en-US" i="1" dirty="0" smtClean="0"/>
               <a:t> </a:t>
             </a:r>
-            <a:r>
-              <a:rPr lang="ru-RU" dirty="0" smtClean="0"/>
-              <a:t>одного шага</a:t>
-            </a:r>
+            <a:endParaRPr lang="ru-RU" dirty="0" smtClean="0"/>
           </a:p>
           <a:p>
             <a:pPr lvl="1">
@@ -6527,11 +6932,7 @@
             </a:r>
             <a:r>
               <a:rPr lang="en-US" dirty="0" smtClean="0"/>
-              <a:t> </a:t>
-            </a:r>
-            <a:r>
-              <a:rPr lang="en-US" dirty="0" smtClean="0"/>
-              <a:t>– </a:t>
+              <a:t> – </a:t>
             </a:r>
             <a:r>
               <a:rPr lang="ru-RU" dirty="0" smtClean="0"/>
@@ -6540,10 +6941,6 @@
             <a:r>
               <a:rPr lang="en-US" dirty="0" smtClean="0"/>
               <a:t> 	</a:t>
-            </a:r>
-            <a:r>
-              <a:rPr lang="en-US" dirty="0" smtClean="0"/>
-              <a:t/>
             </a:r>
             <a:br>
               <a:rPr lang="en-US" dirty="0" smtClean="0"/>
@@ -6562,19 +6959,11 @@
             </a:r>
             <a:r>
               <a:rPr lang="en-US" dirty="0" smtClean="0"/>
-              <a:t> </a:t>
-            </a:r>
-            <a:r>
-              <a:rPr lang="en-US" dirty="0" smtClean="0"/>
-              <a:t>– </a:t>
+              <a:t> – </a:t>
             </a:r>
             <a:r>
               <a:rPr lang="ru-RU" i="1" dirty="0" smtClean="0"/>
-              <a:t>расстояние до</a:t>
-            </a:r>
-            <a:r>
-              <a:rPr lang="ru-RU" i="1" dirty="0" smtClean="0"/>
-              <a:t> условия </a:t>
+              <a:t>расстояние до условия </a:t>
             </a:r>
             <a:r>
               <a:rPr lang="ru-RU" dirty="0" smtClean="0"/>
@@ -6612,11 +7001,7 @@
             </a:r>
             <a:r>
               <a:rPr lang="en-US" dirty="0" smtClean="0"/>
-              <a:t> </a:t>
-            </a:r>
-            <a:r>
-              <a:rPr lang="en-US" dirty="0" smtClean="0"/>
-              <a:t>– </a:t>
+              <a:t> – </a:t>
             </a:r>
             <a:r>
               <a:rPr lang="ru-RU" dirty="0" smtClean="0"/>
@@ -6632,21 +7017,12 @@
             </a:r>
             <a:r>
               <a:rPr lang="ru-RU" dirty="0" smtClean="0"/>
-              <a:t>го с </a:t>
-            </a:r>
-            <a:r>
-              <a:rPr lang="ru-RU" dirty="0" smtClean="0"/>
-              <a:t>шага</a:t>
-            </a:r>
-            <a:r>
-              <a:rPr lang="ru-RU" dirty="0" smtClean="0"/>
-              <a:t>,</a:t>
+              <a:t>го с шага,</a:t>
             </a:r>
             <a:r>
               <a:rPr lang="en-US" dirty="0" smtClean="0"/>
               <a:t>  </a:t>
             </a:r>
-            <a:endParaRPr lang="en-US" dirty="0" smtClean="0"/>
           </a:p>
           <a:p>
             <a:endParaRPr lang="en-US" dirty="0" smtClean="0"/>
@@ -6734,7 +7110,7 @@
           <p:nvPr/>
         </p:nvGraphicFramePr>
         <p:xfrm>
-          <a:off x="4800600" y="4411717"/>
+          <a:off x="3657600" y="4411717"/>
           <a:ext cx="3048000" cy="693683"/>
         </p:xfrm>
         <a:graphic>
@@ -6873,7 +7249,11 @@
           <a:p>
             <a:r>
               <a:rPr lang="ru-RU" dirty="0" smtClean="0"/>
-              <a:t>Автоматизированный объект управления = автомат + объекты управления</a:t>
+              <a:t>Автоматизированный объект управления = автомат + объекты </a:t>
+            </a:r>
+            <a:r>
+              <a:rPr lang="ru-RU" dirty="0" smtClean="0"/>
+              <a:t>управления (ОУ)</a:t>
             </a:r>
           </a:p>
           <a:p>
@@ -6942,11 +7322,7 @@
             <a:pPr lvl="1"/>
             <a:r>
               <a:rPr lang="ru-RU" dirty="0" smtClean="0"/>
-              <a:t>повысить </a:t>
-            </a:r>
-            <a:r>
-              <a:rPr lang="ru-RU" dirty="0" smtClean="0"/>
-              <a:t>уровень автоматизации при </a:t>
+              <a:t>повысить уровень автоматизации при </a:t>
             </a:r>
             <a:r>
               <a:rPr lang="en-US" dirty="0" err="1" smtClean="0"/>
@@ -7156,7 +7532,35 @@
             <a:pPr lvl="1"/>
             <a:r>
               <a:rPr lang="ru-RU" b="1" dirty="0" smtClean="0"/>
-              <a:t>Двадцать </a:t>
+              <a:t>три </a:t>
+            </a:r>
+            <a:r>
+              <a:rPr lang="ru-RU" dirty="0" smtClean="0"/>
+              <a:t>раза снимаются деньги со счета и на счету </a:t>
+            </a:r>
+            <a:r>
+              <a:rPr lang="ru-RU" b="1" dirty="0" smtClean="0"/>
+              <a:t>заканчиваются </a:t>
+            </a:r>
+            <a:r>
+              <a:rPr lang="ru-RU" dirty="0" smtClean="0"/>
+              <a:t>средства на четвертой </a:t>
+            </a:r>
+            <a:r>
+              <a:rPr lang="ru-RU" dirty="0" smtClean="0"/>
+              <a:t>попытке</a:t>
+            </a:r>
+            <a:r>
+              <a:rPr lang="en-US" dirty="0" smtClean="0"/>
+              <a:t>;</a:t>
+            </a:r>
+            <a:endParaRPr lang="ru-RU" dirty="0" smtClean="0"/>
+          </a:p>
+          <a:p>
+            <a:pPr lvl="1"/>
+            <a:r>
+              <a:rPr lang="ru-RU" b="1" dirty="0" smtClean="0"/>
+              <a:t>двадцать </a:t>
             </a:r>
             <a:r>
               <a:rPr lang="ru-RU" dirty="0" smtClean="0"/>
@@ -7164,41 +7568,38 @@
             </a:r>
             <a:r>
               <a:rPr lang="ru-RU" dirty="0"/>
-              <a:t>снимаются деньги со счета и на счету заканчиваются средства</a:t>
-            </a:r>
-            <a:r>
-              <a:rPr lang="ru-RU" dirty="0" smtClean="0"/>
+              <a:t>снимаются деньги со счета и на счету</a:t>
+            </a:r>
+            <a:r>
+              <a:rPr lang="ru-RU" dirty="0" smtClean="0"/>
+              <a:t> </a:t>
+            </a:r>
+            <a:r>
+              <a:rPr lang="ru-RU" b="1" dirty="0" smtClean="0"/>
+              <a:t>не </a:t>
+            </a:r>
+            <a:r>
+              <a:rPr lang="ru-RU" b="1" dirty="0" smtClean="0"/>
+              <a:t>заканчиваются </a:t>
+            </a:r>
+            <a:r>
+              <a:rPr lang="ru-RU" dirty="0" smtClean="0"/>
+              <a:t>средства</a:t>
+            </a:r>
+            <a:r>
+              <a:rPr lang="en-US" dirty="0" smtClean="0"/>
               <a:t>.</a:t>
             </a:r>
-            <a:endParaRPr lang="en-US" dirty="0" smtClean="0"/>
-          </a:p>
-          <a:p>
-            <a:pPr lvl="1"/>
-            <a:r>
-              <a:rPr lang="ru-RU" b="1" dirty="0" smtClean="0"/>
-              <a:t>Три</a:t>
-            </a:r>
-            <a:r>
-              <a:rPr lang="ru-RU" b="1" dirty="0" smtClean="0"/>
-              <a:t> </a:t>
-            </a:r>
-            <a:r>
-              <a:rPr lang="ru-RU" dirty="0" smtClean="0"/>
-              <a:t>раза </a:t>
-            </a:r>
-            <a:r>
-              <a:rPr lang="ru-RU" dirty="0"/>
-              <a:t>снимаются деньги со счета и на счету заканчиваются средства</a:t>
-            </a:r>
-            <a:r>
-              <a:rPr lang="ru-RU" dirty="0" smtClean="0"/>
-              <a:t>.</a:t>
-            </a:r>
-          </a:p>
-          <a:p>
-            <a:r>
-              <a:rPr lang="ru-RU" dirty="0" smtClean="0"/>
-              <a:t>Необходимо подобрать значения переменных для создания теста, соответствующего выбранному сценарию</a:t>
+            <a:endParaRPr lang="ru-RU" dirty="0" smtClean="0"/>
+          </a:p>
+          <a:p>
+            <a:r>
+              <a:rPr lang="ru-RU" dirty="0" smtClean="0"/>
+              <a:t>Необходимо подобрать значения переменных для создания теста,</a:t>
+            </a:r>
+            <a:r>
+              <a:rPr lang="ru-RU" dirty="0" smtClean="0"/>
+              <a:t> выполняющего выбранный сценарий</a:t>
             </a:r>
           </a:p>
           <a:p>
@@ -7265,26 +7666,6 @@
           <a:chExt cx="0" cy="0"/>
         </a:xfrm>
       </p:grpSpPr>
-      <p:graphicFrame>
-        <p:nvGraphicFramePr>
-          <p:cNvPr id="20482" name="Object 2"/>
-          <p:cNvGraphicFramePr>
-            <a:graphicFrameLocks noChangeAspect="1"/>
-          </p:cNvGraphicFramePr>
-          <p:nvPr/>
-        </p:nvGraphicFramePr>
-        <p:xfrm>
-          <a:off x="3200400" y="2709023"/>
-          <a:ext cx="5943600" cy="4377577"/>
-        </p:xfrm>
-        <a:graphic>
-          <a:graphicData uri="http://schemas.openxmlformats.org/presentationml/2006/ole">
-            <p:oleObj spid="_x0000_s20482" name="Document" r:id="rId3" imgW="3086100" imgH="2273300" progId="Word.Document.12">
-              <p:link updateAutomatic="1"/>
-            </p:oleObj>
-          </a:graphicData>
-        </a:graphic>
-      </p:graphicFrame>
       <p:sp>
         <p:nvSpPr>
           <p:cNvPr id="2" name="Title 1"/>
@@ -7332,110 +7713,374 @@
         <p:spPr>
           <a:xfrm>
             <a:off x="228600" y="1489823"/>
-            <a:ext cx="8229600" cy="6019800"/>
+            <a:ext cx="8229600" cy="5063377"/>
           </a:xfrm>
         </p:spPr>
         <p:txBody>
           <a:bodyPr>
-            <a:normAutofit/>
+            <a:normAutofit fontScale="92500"/>
           </a:bodyPr>
           <a:lstStyle/>
           <a:p>
             <a:r>
-              <a:rPr lang="ru-RU" sz="1800" dirty="0" smtClean="0"/>
-              <a:t>Формально запишем первый сценарий как последовательность переходов</a:t>
-            </a:r>
-            <a:r>
-              <a:rPr lang="en-US" sz="1800" dirty="0" smtClean="0"/>
+              <a:rPr lang="ru-RU" sz="2400" dirty="0" smtClean="0"/>
+              <a:t>З</a:t>
+            </a:r>
+            <a:r>
+              <a:rPr lang="ru-RU" sz="2400" dirty="0" smtClean="0"/>
+              <a:t>апишем сценарий </a:t>
+            </a:r>
+            <a:r>
+              <a:rPr lang="ru-RU" sz="2400" dirty="0" smtClean="0"/>
+              <a:t>как последовательность переходов</a:t>
+            </a:r>
+            <a:r>
+              <a:rPr lang="en-US" sz="2400" dirty="0" smtClean="0"/>
               <a:t>:</a:t>
             </a:r>
           </a:p>
           <a:p>
-            <a:r>
-              <a:rPr lang="en-US" sz="1600" dirty="0">
+            <a:pPr lvl="1"/>
+            <a:r>
+              <a:rPr lang="en-US" sz="2162" dirty="0">
                 <a:latin typeface="Courier"/>
                 <a:cs typeface="Courier"/>
               </a:rPr>
               <a:t>t1,</a:t>
             </a:r>
             <a:r>
-              <a:rPr lang="en-US" sz="1600" dirty="0" smtClean="0">
+              <a:rPr lang="en-US" sz="2162" dirty="0" smtClean="0">
                 <a:latin typeface="Courier"/>
                 <a:cs typeface="Courier"/>
               </a:rPr>
               <a:t> t2</a:t>
             </a:r>
             <a:r>
-              <a:rPr lang="en-US" sz="1600" dirty="0">
+              <a:rPr lang="en-US" sz="2162" dirty="0">
                 <a:latin typeface="Courier"/>
                 <a:cs typeface="Courier"/>
               </a:rPr>
-              <a:t>, t4, t5, t2, t4, t5, t2, t4, t5, t2, t4, t5, t2, t4, t5, </a:t>
-            </a:r>
-            <a:br>
-              <a:rPr lang="en-US" sz="1600" dirty="0">
+              <a:t>, </a:t>
+            </a:r>
+            <a:r>
+              <a:rPr lang="en-US" sz="2162" dirty="0" err="1" smtClean="0">
                 <a:latin typeface="Courier"/>
                 <a:cs typeface="Courier"/>
               </a:rPr>
-            </a:br>
-            <a:r>
-              <a:rPr lang="en-US" sz="1600" dirty="0">
+              <a:t>t</a:t>
+            </a:r>
+            <a:r>
+              <a:rPr lang="ru-RU" sz="2162" dirty="0" smtClean="0">
                 <a:latin typeface="Courier"/>
                 <a:cs typeface="Courier"/>
               </a:rPr>
-              <a:t>t2, t4, t5, t2, t4, t5, t2, t4, t5, t2, t4, t5, t2, t4, t5,</a:t>
-            </a:r>
-            <a:r>
-              <a:rPr lang="en-US" sz="1600" dirty="0" smtClean="0">
+              <a:t>3</a:t>
+            </a:r>
+            <a:r>
+              <a:rPr lang="en-US" sz="2162" dirty="0" smtClean="0">
                 <a:latin typeface="Courier"/>
                 <a:cs typeface="Courier"/>
               </a:rPr>
-              <a:t> t6</a:t>
-            </a:r>
-            <a:br>
-              <a:rPr lang="en-US" sz="1600" dirty="0" smtClean="0">
+              <a:t>, </a:t>
+            </a:r>
+            <a:r>
+              <a:rPr lang="en-US" sz="2162" dirty="0" err="1" smtClean="0">
                 <a:latin typeface="Courier"/>
                 <a:cs typeface="Courier"/>
               </a:rPr>
-            </a:br>
-            <a:endParaRPr lang="en-US" sz="1600" dirty="0" smtClean="0">
-              <a:latin typeface="Courier"/>
-              <a:cs typeface="Courier"/>
-            </a:endParaRPr>
-          </a:p>
-          <a:p>
-            <a:r>
-              <a:rPr lang="ru-RU" sz="1400" dirty="0" smtClean="0"/>
-              <a:t>На этом пути 11 переменных, потому то</a:t>
-            </a:r>
-          </a:p>
-          <a:p>
-            <a:r>
-              <a:rPr lang="ru-RU" sz="1400" dirty="0" smtClean="0"/>
-              <a:t>Объяснить задачу на примере</a:t>
-            </a:r>
-          </a:p>
-          <a:p>
-            <a:r>
-              <a:rPr lang="ru-RU" sz="1400" dirty="0" smtClean="0"/>
-              <a:t>Понятно!</a:t>
-            </a:r>
-          </a:p>
-          <a:p>
-            <a:pPr>
-              <a:buNone/>
-            </a:pPr>
-            <a:r>
-              <a:rPr lang="en-US" sz="1400" dirty="0" smtClean="0"/>
+              <a:t>t</a:t>
+            </a:r>
+            <a:r>
+              <a:rPr lang="ru-RU" sz="2162" dirty="0" smtClean="0">
+                <a:latin typeface="Courier"/>
+                <a:cs typeface="Courier"/>
+              </a:rPr>
+              <a:t>2</a:t>
+            </a:r>
+            <a:r>
+              <a:rPr lang="en-US" sz="2162" dirty="0" smtClean="0">
+                <a:latin typeface="Courier"/>
+                <a:cs typeface="Courier"/>
+              </a:rPr>
+              <a:t>, </a:t>
+            </a:r>
+            <a:r>
+              <a:rPr lang="en-US" sz="2162" dirty="0" err="1" smtClean="0">
+                <a:latin typeface="Courier"/>
+                <a:cs typeface="Courier"/>
+              </a:rPr>
+              <a:t>t</a:t>
+            </a:r>
+            <a:r>
+              <a:rPr lang="ru-RU" sz="2162" dirty="0" smtClean="0">
+                <a:latin typeface="Courier"/>
+                <a:cs typeface="Courier"/>
+              </a:rPr>
+              <a:t>3</a:t>
+            </a:r>
+            <a:r>
+              <a:rPr lang="en-US" sz="2162" dirty="0" smtClean="0">
+                <a:latin typeface="Courier"/>
+                <a:cs typeface="Courier"/>
+              </a:rPr>
+              <a:t>, </a:t>
+            </a:r>
+            <a:r>
+              <a:rPr lang="en-US" sz="2162" dirty="0" err="1" smtClean="0">
+                <a:latin typeface="Courier"/>
+                <a:cs typeface="Courier"/>
+              </a:rPr>
+              <a:t>t</a:t>
+            </a:r>
+            <a:r>
+              <a:rPr lang="ru-RU" sz="2162" dirty="0" smtClean="0">
+                <a:latin typeface="Courier"/>
+                <a:cs typeface="Courier"/>
+              </a:rPr>
+              <a:t>2</a:t>
+            </a:r>
+            <a:r>
+              <a:rPr lang="en-US" sz="2162" dirty="0" smtClean="0">
+                <a:latin typeface="Courier"/>
+                <a:cs typeface="Courier"/>
+              </a:rPr>
+              <a:t>, </a:t>
+            </a:r>
+            <a:r>
+              <a:rPr lang="en-US" sz="2162" dirty="0" err="1" smtClean="0">
+                <a:latin typeface="Courier"/>
+                <a:cs typeface="Courier"/>
+              </a:rPr>
+              <a:t>t</a:t>
+            </a:r>
+            <a:r>
+              <a:rPr lang="ru-RU" sz="2162" dirty="0" smtClean="0">
+                <a:latin typeface="Courier"/>
+                <a:cs typeface="Courier"/>
+              </a:rPr>
+              <a:t>3</a:t>
+            </a:r>
+            <a:r>
+              <a:rPr lang="en-US" sz="2162" dirty="0" smtClean="0">
+                <a:latin typeface="Courier"/>
+                <a:cs typeface="Courier"/>
+              </a:rPr>
+              <a:t>, </a:t>
+            </a:r>
+            <a:r>
+              <a:rPr lang="en-US" sz="2162" dirty="0">
+                <a:latin typeface="Courier"/>
+                <a:cs typeface="Courier"/>
+              </a:rPr>
+              <a:t>t2, </a:t>
+            </a:r>
+            <a:r>
+              <a:rPr lang="en-US" sz="2162" dirty="0" smtClean="0">
+                <a:latin typeface="Courier"/>
+                <a:cs typeface="Courier"/>
+              </a:rPr>
+              <a:t>t4</a:t>
+            </a:r>
+          </a:p>
+          <a:p>
+            <a:r>
+              <a:rPr lang="ru-RU" sz="2595" dirty="0" smtClean="0"/>
+              <a:t>На этом пути задействовано 4 переменных</a:t>
+            </a:r>
+            <a:r>
+              <a:rPr lang="en-US" sz="2595" dirty="0" smtClean="0"/>
+              <a:t>:</a:t>
+            </a:r>
+          </a:p>
+          <a:p>
+            <a:pPr lvl="1"/>
+            <a:r>
+              <a:rPr lang="en-US" sz="2400" dirty="0" err="1" smtClean="0">
+                <a:latin typeface="Courier"/>
+                <a:cs typeface="Courier"/>
+              </a:rPr>
+              <a:t>ext_sum</a:t>
+            </a:r>
+            <a:r>
+              <a:rPr lang="en-US" sz="2400" dirty="0" smtClean="0">
+                <a:latin typeface="Courier"/>
+                <a:cs typeface="Courier"/>
+              </a:rPr>
               <a:t> </a:t>
             </a:r>
-            <a:endParaRPr lang="ru-RU" sz="1400" dirty="0" smtClean="0"/>
+            <a:r>
+              <a:rPr lang="en-US" sz="2400" dirty="0" smtClean="0"/>
+              <a:t>- </a:t>
+            </a:r>
+            <a:r>
+              <a:rPr lang="ru-RU" sz="2400" dirty="0" smtClean="0"/>
+              <a:t>и</a:t>
+            </a:r>
+            <a:r>
+              <a:rPr lang="ru-RU" sz="2400" dirty="0" smtClean="0"/>
+              <a:t>значальная сумма на счету</a:t>
+            </a:r>
+            <a:r>
+              <a:rPr lang="en-US" sz="2400" dirty="0" smtClean="0"/>
+              <a:t>;</a:t>
+            </a:r>
+          </a:p>
+          <a:p>
+            <a:pPr lvl="1"/>
+            <a:r>
+              <a:rPr lang="en-US" sz="2400" dirty="0" smtClean="0">
+                <a:latin typeface="Courier"/>
+                <a:cs typeface="Courier"/>
+              </a:rPr>
+              <a:t>ext_x1 </a:t>
+            </a:r>
+            <a:r>
+              <a:rPr lang="en-US" sz="2400" dirty="0" smtClean="0"/>
+              <a:t>– </a:t>
+            </a:r>
+            <a:r>
+              <a:rPr lang="ru-RU" sz="2400" dirty="0" smtClean="0"/>
+              <a:t>сняли первый раз</a:t>
+            </a:r>
+            <a:r>
+              <a:rPr lang="en-US" sz="2400" dirty="0" smtClean="0"/>
+              <a:t>;</a:t>
+            </a:r>
+          </a:p>
+          <a:p>
+            <a:pPr lvl="1"/>
+            <a:r>
+              <a:rPr lang="en-US" sz="2400" dirty="0" smtClean="0">
+                <a:latin typeface="Courier"/>
+                <a:cs typeface="Courier"/>
+              </a:rPr>
+              <a:t>ext_x2 </a:t>
+            </a:r>
+            <a:r>
+              <a:rPr lang="en-US" sz="2400" dirty="0" smtClean="0"/>
+              <a:t>– </a:t>
+            </a:r>
+            <a:r>
+              <a:rPr lang="ru-RU" sz="2400" dirty="0" smtClean="0"/>
+              <a:t>сняли</a:t>
+            </a:r>
+            <a:r>
+              <a:rPr lang="ru-RU" sz="2400" dirty="0" smtClean="0"/>
+              <a:t> второй раз</a:t>
+            </a:r>
+            <a:r>
+              <a:rPr lang="en-US" sz="2400" dirty="0" smtClean="0"/>
+              <a:t>;</a:t>
+            </a:r>
+            <a:endParaRPr lang="ru-RU" sz="2400" dirty="0" smtClean="0"/>
+          </a:p>
+          <a:p>
+            <a:pPr lvl="1"/>
+            <a:r>
+              <a:rPr lang="en-US" sz="2400" dirty="0" smtClean="0">
+                <a:latin typeface="Courier"/>
+                <a:cs typeface="Courier"/>
+              </a:rPr>
+              <a:t>ext_x3 </a:t>
+            </a:r>
+            <a:r>
+              <a:rPr lang="en-US" sz="2400" dirty="0" smtClean="0"/>
+              <a:t>– </a:t>
+            </a:r>
+            <a:r>
+              <a:rPr lang="ru-RU" sz="2400" dirty="0" smtClean="0"/>
+              <a:t>сняли</a:t>
+            </a:r>
+            <a:r>
+              <a:rPr lang="ru-RU" sz="2400" dirty="0" smtClean="0"/>
+              <a:t> третий </a:t>
+            </a:r>
+            <a:r>
+              <a:rPr lang="ru-RU" sz="2400" dirty="0" smtClean="0"/>
+              <a:t>раз</a:t>
+            </a:r>
+            <a:r>
+              <a:rPr lang="en-US" sz="2400" dirty="0" smtClean="0"/>
+              <a:t>;</a:t>
+            </a:r>
+            <a:endParaRPr lang="ru-RU" sz="2400" dirty="0" smtClean="0"/>
+          </a:p>
+          <a:p>
+            <a:pPr lvl="1"/>
+            <a:r>
+              <a:rPr lang="en-US" sz="2400" dirty="0" err="1" smtClean="0">
+                <a:latin typeface="Courier"/>
+                <a:cs typeface="Courier"/>
+              </a:rPr>
+              <a:t>ext_x</a:t>
+            </a:r>
+            <a:r>
+              <a:rPr lang="ru-RU" sz="2400" dirty="0" smtClean="0">
+                <a:latin typeface="Courier"/>
+                <a:cs typeface="Courier"/>
+              </a:rPr>
+              <a:t>4</a:t>
+            </a:r>
+            <a:r>
+              <a:rPr lang="en-US" sz="2400" dirty="0" smtClean="0">
+                <a:latin typeface="Courier"/>
+                <a:cs typeface="Courier"/>
+              </a:rPr>
+              <a:t> </a:t>
+            </a:r>
+            <a:r>
+              <a:rPr lang="en-US" sz="2400" dirty="0" smtClean="0"/>
+              <a:t>–</a:t>
+            </a:r>
+            <a:r>
+              <a:rPr lang="en-US" sz="2400" dirty="0" smtClean="0"/>
+              <a:t> </a:t>
+            </a:r>
+            <a:r>
+              <a:rPr lang="ru-RU" sz="2400" dirty="0" smtClean="0"/>
+              <a:t>попробовали снять четвертый раз</a:t>
+            </a:r>
+            <a:r>
+              <a:rPr lang="ru-RU" sz="2400" dirty="0" smtClean="0"/>
+              <a:t>.</a:t>
+            </a:r>
+            <a:endParaRPr lang="ru-RU" sz="2400" dirty="0" smtClean="0"/>
+          </a:p>
+          <a:p>
+            <a:r>
+              <a:rPr lang="ru-RU" sz="2800" dirty="0" smtClean="0"/>
+              <a:t>Разработан инструмент</a:t>
+            </a:r>
+            <a:r>
+              <a:rPr lang="en-US" sz="2800" dirty="0" smtClean="0"/>
+              <a:t>:</a:t>
+            </a:r>
+          </a:p>
+          <a:p>
+            <a:pPr lvl="1"/>
+            <a:r>
+              <a:rPr lang="ru-RU" sz="2400" dirty="0" smtClean="0"/>
+              <a:t>на вход </a:t>
+            </a:r>
+            <a:r>
+              <a:rPr lang="en-US" sz="2400" dirty="0" smtClean="0"/>
+              <a:t>– </a:t>
+            </a:r>
+            <a:r>
+              <a:rPr lang="ru-RU" sz="2400" dirty="0" smtClean="0"/>
+              <a:t>модель и заданную последовательность переходов</a:t>
+            </a:r>
+            <a:endParaRPr lang="en-US" sz="2400" dirty="0" smtClean="0"/>
+          </a:p>
+          <a:p>
+            <a:pPr lvl="1"/>
+            <a:r>
+              <a:rPr lang="ru-RU" sz="2400" dirty="0" smtClean="0"/>
+              <a:t>выдает значения переменных для прохождения этого пути</a:t>
+            </a:r>
           </a:p>
           <a:p>
             <a:endParaRPr lang="ru-RU" sz="1800" dirty="0" smtClean="0"/>
-          </a:p>
-          <a:p>
-            <a:endParaRPr lang="en-US" sz="1800" dirty="0"/>
           </a:p>
         </p:txBody>
       </p:sp>
@@ -7495,26 +8140,6 @@
           <a:chExt cx="0" cy="0"/>
         </a:xfrm>
       </p:grpSpPr>
-      <p:graphicFrame>
-        <p:nvGraphicFramePr>
-          <p:cNvPr id="20482" name="Object 2"/>
-          <p:cNvGraphicFramePr>
-            <a:graphicFrameLocks noChangeAspect="1"/>
-          </p:cNvGraphicFramePr>
-          <p:nvPr/>
-        </p:nvGraphicFramePr>
-        <p:xfrm>
-          <a:off x="3200400" y="2709023"/>
-          <a:ext cx="5943600" cy="4377577"/>
-        </p:xfrm>
-        <a:graphic>
-          <a:graphicData uri="http://schemas.openxmlformats.org/presentationml/2006/ole">
-            <p:oleObj spid="_x0000_s55298" name="Document" r:id="rId3" imgW="3086100" imgH="2273300" progId="Word.Document.12">
-              <p:link updateAutomatic="1"/>
-            </p:oleObj>
-          </a:graphicData>
-        </a:graphic>
-      </p:graphicFrame>
       <p:sp>
         <p:nvSpPr>
           <p:cNvPr id="2" name="Title 1"/>
@@ -7525,12 +8150,7 @@
             <p:ph type="title"/>
           </p:nvPr>
         </p:nvSpPr>
-        <p:spPr>
-          <a:xfrm>
-            <a:off x="457200" y="274638"/>
-            <a:ext cx="8229600" cy="563562"/>
-          </a:xfrm>
-        </p:spPr>
+        <p:spPr/>
         <p:txBody>
           <a:bodyPr>
             <a:normAutofit fontScale="90000"/>
@@ -7543,7 +8163,7 @@
             </a:r>
             <a:r>
               <a:rPr lang="ru-RU" dirty="0" smtClean="0"/>
-              <a:t>Пример поиска значений переменных (3)</a:t>
+              <a:t>Автоматическая генерация кода теста для запуска</a:t>
             </a:r>
             <a:endParaRPr lang="en-US" dirty="0"/>
           </a:p>
@@ -7559,161 +8179,178 @@
             <p:ph idx="1"/>
           </p:nvPr>
         </p:nvSpPr>
-        <p:spPr>
-          <a:xfrm>
-            <a:off x="228600" y="1489823"/>
-            <a:ext cx="8229600" cy="6019800"/>
-          </a:xfrm>
-        </p:spPr>
+        <p:spPr/>
         <p:txBody>
           <a:bodyPr>
-            <a:normAutofit/>
+            <a:normAutofit fontScale="70000" lnSpcReduction="20000"/>
           </a:bodyPr>
           <a:lstStyle/>
           <a:p>
             <a:r>
-              <a:rPr lang="ru-RU" sz="1800" dirty="0" smtClean="0"/>
-              <a:t>Автоматически найденные значения,</a:t>
-            </a:r>
-            <a:br>
-              <a:rPr lang="ru-RU" sz="1800" dirty="0" smtClean="0"/>
-            </a:br>
-            <a:r>
-              <a:rPr lang="ru-RU" sz="1800" dirty="0" smtClean="0"/>
-              <a:t>для выполнения тестового сценария</a:t>
-            </a:r>
-            <a:r>
-              <a:rPr lang="en-US" sz="1800" dirty="0" smtClean="0"/>
+              <a:rPr lang="ru-RU" sz="3429" dirty="0" smtClean="0"/>
+              <a:t>Автоматически найденные </a:t>
+            </a:r>
+            <a:r>
+              <a:rPr lang="ru-RU" sz="3429" dirty="0" smtClean="0"/>
+              <a:t>значения</a:t>
+            </a:r>
+            <a:r>
+              <a:rPr lang="en-US" sz="3429" dirty="0" smtClean="0"/>
               <a:t>:</a:t>
             </a:r>
-            <a:endParaRPr lang="ru-RU" sz="1800" dirty="0" smtClean="0"/>
+            <a:endParaRPr lang="ru-RU" sz="3429" dirty="0" smtClean="0"/>
           </a:p>
           <a:p>
             <a:pPr lvl="1"/>
             <a:r>
-              <a:rPr lang="en-US" sz="1400" dirty="0" smtClean="0">
+              <a:rPr lang="en-US" sz="2857" dirty="0" smtClean="0">
                 <a:latin typeface="Courier"/>
                 <a:cs typeface="Courier"/>
               </a:rPr>
-              <a:t>ext_acount = 28688; </a:t>
-            </a:r>
-          </a:p>
-          <a:p>
-            <a:pPr lvl="1"/>
-            <a:r>
-              <a:rPr lang="en-US" sz="1400" dirty="0" smtClean="0">
+              <a:t>ext</a:t>
+            </a:r>
+            <a:r>
+              <a:rPr lang="ru-RU" sz="2857" dirty="0" smtClean="0">
                 <a:latin typeface="Courier"/>
                 <a:cs typeface="Courier"/>
               </a:rPr>
-              <a:t>ext_account1 = 3198; </a:t>
-            </a:r>
-          </a:p>
-          <a:p>
-            <a:pPr lvl="1"/>
-            <a:r>
-              <a:rPr lang="en-US" sz="1400" dirty="0" smtClean="0">
+              <a:t>_</a:t>
+            </a:r>
+            <a:r>
+              <a:rPr lang="en-US" sz="2857" dirty="0" smtClean="0">
                 <a:latin typeface="Courier"/>
                 <a:cs typeface="Courier"/>
               </a:rPr>
-              <a:t>ext_account2 = 4612; </a:t>
+              <a:t>sum = 15673; </a:t>
             </a:r>
           </a:p>
           <a:p>
             <a:pPr lvl="1"/>
             <a:r>
-              <a:rPr lang="en-US" sz="1400" dirty="0" smtClean="0">
+              <a:rPr lang="en-US" sz="2857" dirty="0" smtClean="0">
                 <a:latin typeface="Courier"/>
                 <a:cs typeface="Courier"/>
               </a:rPr>
-              <a:t>ext_account3 = 2280; </a:t>
-            </a:r>
-          </a:p>
-          <a:p>
-            <a:pPr lvl="1"/>
-            <a:r>
-              <a:rPr lang="en-US" sz="1400" dirty="0" smtClean="0">
+              <a:t>ext_x1 = 4357</a:t>
+            </a:r>
+            <a:r>
+              <a:rPr lang="en-US" sz="2857" dirty="0" smtClean="0">
                 <a:latin typeface="Courier"/>
                 <a:cs typeface="Courier"/>
               </a:rPr>
-              <a:t>ext_account4 = 2310; </a:t>
-            </a:r>
-          </a:p>
-          <a:p>
-            <a:pPr lvl="1"/>
-            <a:r>
-              <a:rPr lang="en-US" sz="1400" dirty="0" smtClean="0">
+              <a:t>; ext_x2 </a:t>
+            </a:r>
+            <a:r>
+              <a:rPr lang="en-US" sz="2857" dirty="0" smtClean="0">
                 <a:latin typeface="Courier"/>
                 <a:cs typeface="Courier"/>
               </a:rPr>
-              <a:t>ext_account5 = 4311; </a:t>
+              <a:t>= 8023; </a:t>
             </a:r>
           </a:p>
           <a:p>
             <a:pPr lvl="1"/>
             <a:r>
-              <a:rPr lang="en-US" sz="1400" dirty="0" smtClean="0">
+              <a:rPr lang="en-US" sz="2857" dirty="0" smtClean="0">
                 <a:latin typeface="Courier"/>
                 <a:cs typeface="Courier"/>
               </a:rPr>
-              <a:t>ext_account6 = 1786; </a:t>
-            </a:r>
-          </a:p>
-          <a:p>
-            <a:pPr lvl="1"/>
-            <a:r>
-              <a:rPr lang="en-US" sz="1400" dirty="0" smtClean="0">
+              <a:t>ext_x3 = 2162</a:t>
+            </a:r>
+            <a:r>
+              <a:rPr lang="en-US" sz="2857" dirty="0" smtClean="0">
                 <a:latin typeface="Courier"/>
                 <a:cs typeface="Courier"/>
               </a:rPr>
-              <a:t>ext_account7 = 3867; </a:t>
-            </a:r>
-          </a:p>
-          <a:p>
-            <a:pPr lvl="1"/>
-            <a:r>
-              <a:rPr lang="en-US" sz="1400" dirty="0" smtClean="0">
+              <a:t>; ext_x4 </a:t>
+            </a:r>
+            <a:r>
+              <a:rPr lang="en-US" sz="2857" dirty="0" smtClean="0">
                 <a:latin typeface="Courier"/>
                 <a:cs typeface="Courier"/>
               </a:rPr>
-              <a:t>ext_account8 = 1217; </a:t>
-            </a:r>
-          </a:p>
-          <a:p>
-            <a:pPr lvl="1"/>
-            <a:r>
-              <a:rPr lang="en-US" sz="1400" dirty="0" smtClean="0">
+              <a:t>= 9287</a:t>
+            </a:r>
+            <a:r>
+              <a:rPr lang="en-US" sz="2857" dirty="0" smtClean="0">
                 <a:latin typeface="Courier"/>
                 <a:cs typeface="Courier"/>
               </a:rPr>
-              <a:t>ext_account9 = 2739; </a:t>
-            </a:r>
-          </a:p>
-          <a:p>
-            <a:pPr lvl="1"/>
-            <a:r>
-              <a:rPr lang="en-US" sz="1400" dirty="0" smtClean="0">
-                <a:latin typeface="Courier"/>
-                <a:cs typeface="Courier"/>
-              </a:rPr>
-              <a:t>ext_account10 = 4519.</a:t>
-            </a:r>
-            <a:r>
-              <a:rPr lang="en-US" sz="1400" dirty="0" smtClean="0"/>
-              <a:t> </a:t>
-            </a:r>
-            <a:endParaRPr lang="ru-RU" sz="1400" dirty="0" smtClean="0"/>
-          </a:p>
-          <a:p>
-            <a:endParaRPr lang="ru-RU" sz="1800" dirty="0" smtClean="0"/>
-          </a:p>
-          <a:p>
-            <a:endParaRPr lang="en-US" sz="1800" dirty="0"/>
-          </a:p>
-        </p:txBody>
-      </p:sp>
-      <p:sp>
-        <p:nvSpPr>
-          <p:cNvPr id="5" name="Slide Number Placeholder 4"/>
+              <a:t>.</a:t>
+            </a:r>
+            <a:endParaRPr lang="en-US" sz="5143" dirty="0" smtClean="0"/>
+          </a:p>
+          <a:p>
+            <a:r>
+              <a:rPr lang="ru-RU" dirty="0" smtClean="0"/>
+              <a:t>Найденные значения позволяют сгенерировать </a:t>
+            </a:r>
+            <a:r>
+              <a:rPr lang="ru-RU" dirty="0" smtClean="0"/>
+              <a:t>автоматически код </a:t>
+            </a:r>
+            <a:r>
+              <a:rPr lang="ru-RU" dirty="0" smtClean="0"/>
+              <a:t>теста на языке </a:t>
+            </a:r>
+            <a:r>
+              <a:rPr lang="en-US" i="1" dirty="0" smtClean="0"/>
+              <a:t>Java</a:t>
+            </a:r>
+            <a:r>
+              <a:rPr lang="ru-RU" dirty="0" smtClean="0"/>
+              <a:t>, </a:t>
+            </a:r>
+            <a:r>
+              <a:rPr lang="ru-RU" dirty="0" smtClean="0"/>
+              <a:t>который пригоден для </a:t>
+            </a:r>
+            <a:r>
+              <a:rPr lang="ru-RU" dirty="0" smtClean="0"/>
+              <a:t>запуска</a:t>
+            </a:r>
+            <a:r>
+              <a:rPr lang="en-US" dirty="0" smtClean="0"/>
+              <a:t>.</a:t>
+            </a:r>
+            <a:endParaRPr lang="ru-RU" dirty="0" smtClean="0"/>
+          </a:p>
+          <a:p>
+            <a:r>
+              <a:rPr lang="ru-RU" dirty="0" smtClean="0"/>
+              <a:t>Сгенерированные тесты можно объединять в тестовые наборы и запускать впоследствии.</a:t>
+            </a:r>
+          </a:p>
+          <a:p>
+            <a:r>
+              <a:rPr lang="ru-RU" dirty="0" smtClean="0"/>
+              <a:t>Наборы</a:t>
+            </a:r>
+            <a:r>
+              <a:rPr lang="ru-RU" dirty="0" smtClean="0"/>
+              <a:t> тест</a:t>
+            </a:r>
+            <a:r>
+              <a:rPr lang="ru-RU" dirty="0" smtClean="0"/>
+              <a:t>ов</a:t>
+            </a:r>
+            <a:r>
+              <a:rPr lang="ru-RU" dirty="0" smtClean="0"/>
+              <a:t> удобно применять для регрессионного и стресс-тестирования.</a:t>
+            </a:r>
+          </a:p>
+          <a:p>
+            <a:r>
+              <a:rPr lang="ru-RU" dirty="0" smtClean="0"/>
+              <a:t>Для одного сценария могут подходить разные наборы переменных, для повышения надежности удобно иметь много тестов, проверяющих один и тот же сценарий.</a:t>
+            </a:r>
+            <a:endParaRPr lang="ru-RU" dirty="0" smtClean="0"/>
+          </a:p>
+        </p:txBody>
+      </p:sp>
+      <p:sp>
+        <p:nvSpPr>
+          <p:cNvPr id="4" name="Slide Number Placeholder 3"/>
           <p:cNvSpPr>
             <a:spLocks noGrp="1"/>
           </p:cNvSpPr>
@@ -7740,13 +8377,6 @@
   <p:clrMapOvr>
     <a:masterClrMapping/>
   </p:clrMapOvr>
-  <p:timing>
-    <p:tnLst>
-      <p:par>
-        <p:cTn id="1" dur="indefinite" restart="never" nodeType="tmRoot"/>
-      </p:par>
-    </p:tnLst>
-  </p:timing>
 </p:sld>
 </file>
 
@@ -7786,11 +8416,15 @@
           <a:p>
             <a:r>
               <a:rPr lang="en-US" dirty="0" smtClean="0"/>
-              <a:t>III. </a:t>
-            </a:r>
-            <a:r>
-              <a:rPr lang="ru-RU" dirty="0" smtClean="0"/>
-              <a:t>Автоматическая генерация кода теста для запуска</a:t>
+              <a:t>IV. </a:t>
+            </a:r>
+            <a:r>
+              <a:rPr lang="ru-RU" dirty="0" smtClean="0"/>
+              <a:t>Оценка корректности поведения системы во время запуска </a:t>
+            </a:r>
+            <a:r>
+              <a:rPr lang="ru-RU" dirty="0" smtClean="0"/>
+              <a:t>тестов (1)</a:t>
             </a:r>
             <a:endParaRPr lang="en-US" dirty="0"/>
           </a:p>
@@ -7808,18 +8442,75 @@
         </p:nvSpPr>
         <p:spPr/>
         <p:txBody>
-          <a:bodyPr/>
-          <a:lstStyle/>
-          <a:p>
-            <a:r>
-              <a:rPr lang="ru-RU" dirty="0" smtClean="0"/>
-              <a:t>С использованием найденныех значений генерируется автоматически код теста, который пригоден для запуска</a:t>
-            </a:r>
-          </a:p>
-          <a:p>
-            <a:r>
-              <a:rPr lang="ru-RU" dirty="0" smtClean="0"/>
-              <a:t>Для генерации используется такой-то инструмент!</a:t>
+          <a:bodyPr>
+            <a:normAutofit fontScale="92500" lnSpcReduction="10000"/>
+          </a:bodyPr>
+          <a:lstStyle/>
+          <a:p>
+            <a:r>
+              <a:rPr lang="ru-RU" dirty="0" smtClean="0"/>
+              <a:t>Необходимо </a:t>
+            </a:r>
+            <a:r>
+              <a:rPr lang="ru-RU" dirty="0" smtClean="0"/>
+              <a:t>оценить корректность поведения автоматной программы во время выполнения этого теста.</a:t>
+            </a:r>
+          </a:p>
+          <a:p>
+            <a:r>
+              <a:rPr lang="ru-RU" dirty="0" smtClean="0"/>
+              <a:t>Это</a:t>
+            </a:r>
+            <a:r>
+              <a:rPr lang="ru-RU" dirty="0" smtClean="0"/>
+              <a:t> выполняется автоматически для </a:t>
+            </a:r>
+            <a:r>
+              <a:rPr lang="ru-RU" dirty="0" smtClean="0"/>
+              <a:t>тех путей, которые содержат контракты.</a:t>
+            </a:r>
+            <a:endParaRPr lang="ru-RU" dirty="0" smtClean="0"/>
+          </a:p>
+          <a:p>
+            <a:r>
+              <a:rPr lang="ru-RU" dirty="0" smtClean="0"/>
+              <a:t>Во </a:t>
+            </a:r>
+            <a:r>
+              <a:rPr lang="ru-RU" dirty="0" smtClean="0"/>
+              <a:t>время выполнения программой сгенерированных тестов используется инструмент </a:t>
+            </a:r>
+            <a:r>
+              <a:rPr lang="en-US" i="1" dirty="0" smtClean="0"/>
+              <a:t>JML Runtime Assertion Checker</a:t>
+            </a:r>
+            <a:r>
+              <a:rPr lang="ru-RU" dirty="0" smtClean="0"/>
+              <a:t> для динамической проверки </a:t>
+            </a:r>
+            <a:r>
+              <a:rPr lang="en-US" i="1" dirty="0" smtClean="0"/>
+              <a:t>JML</a:t>
+            </a:r>
+            <a:r>
+              <a:rPr lang="en-US" dirty="0" smtClean="0"/>
+              <a:t>-</a:t>
+            </a:r>
+            <a:r>
+              <a:rPr lang="ru-RU" dirty="0" smtClean="0"/>
+              <a:t>контрактов, интегрированных в </a:t>
+            </a:r>
+            <a:r>
+              <a:rPr lang="en-US" i="1" dirty="0" smtClean="0"/>
+              <a:t>Java</a:t>
+            </a:r>
+            <a:r>
+              <a:rPr lang="en-US" dirty="0" smtClean="0"/>
+              <a:t>-</a:t>
+            </a:r>
+            <a:r>
+              <a:rPr lang="ru-RU" dirty="0" smtClean="0"/>
+              <a:t>код.</a:t>
             </a:r>
             <a:endParaRPr lang="en-US" dirty="0"/>
           </a:p>
@@ -7897,7 +8588,11 @@
             </a:r>
             <a:r>
               <a:rPr lang="ru-RU" dirty="0" smtClean="0"/>
-              <a:t>Оценка корректности поведения системы во время запуска тестов</a:t>
+              <a:t>Оценка корректности поведения системы во время запуска </a:t>
+            </a:r>
+            <a:r>
+              <a:rPr lang="ru-RU" dirty="0" smtClean="0"/>
+              <a:t>тестов (2)</a:t>
             </a:r>
             <a:endParaRPr lang="en-US" dirty="0"/>
           </a:p>
@@ -7916,31 +8611,91 @@
         <p:spPr/>
         <p:txBody>
           <a:bodyPr>
-            <a:normAutofit fontScale="77500" lnSpcReduction="20000"/>
+            <a:normAutofit fontScale="85000" lnSpcReduction="10000"/>
           </a:bodyPr>
           <a:lstStyle/>
           <a:p>
             <a:r>
               <a:rPr lang="ru-RU" dirty="0" smtClean="0"/>
-              <a:t>Итак, имеется тест.</a:t>
-            </a:r>
-          </a:p>
-          <a:p>
-            <a:r>
-              <a:rPr lang="ru-RU" dirty="0" smtClean="0"/>
-              <a:t>Необходимо оценить корректность поведения автоматной программы во время выполнения этого теста.</a:t>
-            </a:r>
-          </a:p>
-          <a:p>
-            <a:r>
-              <a:rPr lang="ru-RU" dirty="0" smtClean="0"/>
-              <a:t>Это возможно только для тех путей, которые содержат контракты.</a:t>
-            </a:r>
-          </a:p>
-          <a:p>
-            <a:r>
-              <a:rPr lang="ru-RU" dirty="0" smtClean="0"/>
-              <a:t>На остальных сценариях соответствие со спецификацией не проверить, но можно убедиться в отсутствии зависаний</a:t>
+              <a:t>Для рассмотренного пути и найденных значений при запуске тест</a:t>
+            </a:r>
+            <a:r>
+              <a:rPr lang="ru-RU" dirty="0" smtClean="0"/>
+              <a:t>а</a:t>
+            </a:r>
+            <a:r>
+              <a:rPr lang="ru-RU" dirty="0" smtClean="0"/>
+              <a:t> будет проверяться условие</a:t>
+            </a:r>
+            <a:r>
+              <a:rPr lang="en-US" dirty="0" smtClean="0"/>
+              <a:t>:</a:t>
+            </a:r>
+          </a:p>
+          <a:p>
+            <a:pPr lvl="1"/>
+            <a:r>
+              <a:rPr lang="ru-RU" dirty="0" smtClean="0"/>
+              <a:t>В день со счета может быть снято не более </a:t>
+            </a:r>
+            <a:r>
+              <a:rPr lang="en-US" dirty="0" smtClean="0"/>
+              <a:t>50000</a:t>
+            </a:r>
+            <a:r>
+              <a:rPr lang="en-US" dirty="0" smtClean="0"/>
+              <a:t>;</a:t>
+            </a:r>
+            <a:endParaRPr lang="en-US" dirty="0" smtClean="0"/>
+          </a:p>
+          <a:p>
+            <a:pPr lvl="1"/>
+            <a:r>
+              <a:rPr lang="en-US" dirty="0" smtClean="0">
+                <a:latin typeface="Courier"/>
+                <a:cs typeface="Courier"/>
+              </a:rPr>
+              <a:t>@invariant today &lt;= </a:t>
+            </a:r>
+            <a:r>
+              <a:rPr lang="en-US" dirty="0" smtClean="0">
+                <a:latin typeface="Courier"/>
+                <a:cs typeface="Courier"/>
+              </a:rPr>
+              <a:t>50</a:t>
+            </a:r>
+            <a:r>
+              <a:rPr lang="ru-RU" dirty="0" smtClean="0">
+                <a:latin typeface="Courier"/>
+                <a:cs typeface="Courier"/>
+              </a:rPr>
+              <a:t>0</a:t>
+            </a:r>
+            <a:r>
+              <a:rPr lang="en-US" dirty="0" smtClean="0">
+                <a:latin typeface="Courier"/>
+                <a:cs typeface="Courier"/>
+              </a:rPr>
+              <a:t>00.</a:t>
+            </a:r>
+            <a:endParaRPr lang="ru-RU" dirty="0" smtClean="0">
+              <a:latin typeface="Courier"/>
+              <a:cs typeface="Courier"/>
+            </a:endParaRPr>
+          </a:p>
+          <a:p>
+            <a:r>
+              <a:rPr lang="ru-RU" dirty="0" smtClean="0">
+                <a:latin typeface="Calibri"/>
+                <a:cs typeface="Calibri"/>
+              </a:rPr>
+              <a:t>При использовании настоящих объектов управления, а не сгенерированных значений, будет также проверяться, что они выполняют требования спецификации.</a:t>
+            </a:r>
+          </a:p>
+          <a:p>
+            <a:r>
+              <a:rPr lang="ru-RU" dirty="0" smtClean="0"/>
+              <a:t>Запуск тестов также позволяет обнаружить зависания</a:t>
             </a:r>
             <a:r>
               <a:rPr lang="en-US" dirty="0" smtClean="0"/>
@@ -7948,11 +8703,19 @@
             </a:r>
             <a:r>
               <a:rPr lang="ru-RU" dirty="0" smtClean="0"/>
-              <a:t>и исключительных ситуации (</a:t>
+              <a:t>и </a:t>
+            </a:r>
+            <a:r>
+              <a:rPr lang="ru-RU" dirty="0" smtClean="0"/>
+              <a:t>исключительные </a:t>
+            </a:r>
+            <a:r>
+              <a:rPr lang="ru-RU" dirty="0" smtClean="0"/>
+              <a:t>ситуации (</a:t>
             </a:r>
             <a:r>
               <a:rPr lang="en-US" i="1" dirty="0" smtClean="0"/>
-              <a:t>exception</a:t>
+              <a:t>exceptions</a:t>
             </a:r>
             <a:r>
               <a:rPr lang="ru-RU" dirty="0" smtClean="0"/>
@@ -7960,11 +8723,18 @@
             </a:r>
           </a:p>
           <a:p>
-            <a:r>
-              <a:rPr lang="ru-RU" dirty="0" smtClean="0"/>
-              <a:t>Используется специальный инструмент для проверки контрактов во время выполнения программы.</a:t>
-            </a:r>
-            <a:endParaRPr lang="en-US" dirty="0"/>
+            <a:endParaRPr lang="en-US" dirty="0" smtClean="0">
+              <a:latin typeface="Calibri"/>
+              <a:cs typeface="Calibri"/>
+            </a:endParaRPr>
+          </a:p>
+          <a:p>
+            <a:pPr lvl="1"/>
+            <a:endParaRPr lang="ru-RU" dirty="0" smtClean="0"/>
+          </a:p>
+          <a:p>
+            <a:pPr lvl="1"/>
+            <a:endParaRPr lang="ru-RU" dirty="0" smtClean="0"/>
           </a:p>
         </p:txBody>
       </p:sp>
@@ -8035,12 +8805,8 @@
           <a:lstStyle/>
           <a:p>
             <a:r>
-              <a:rPr lang="en-US" dirty="0" smtClean="0"/>
-              <a:t>IV. </a:t>
-            </a:r>
-            <a:r>
-              <a:rPr lang="ru-RU" dirty="0" smtClean="0"/>
-              <a:t>Оценка корректности поведения системы во время запуска тестов</a:t>
+              <a:rPr lang="ru-RU" dirty="0" smtClean="0"/>
+              <a:t>Подход к тестированию автоматных программ</a:t>
             </a:r>
             <a:endParaRPr lang="en-US" dirty="0"/>
           </a:p>
@@ -8056,75 +8822,89 @@
             <p:ph idx="1"/>
           </p:nvPr>
         </p:nvSpPr>
-        <p:spPr/>
+        <p:spPr>
+          <a:xfrm>
+            <a:off x="457200" y="1600200"/>
+            <a:ext cx="8229600" cy="4756150"/>
+          </a:xfrm>
+        </p:spPr>
         <p:txBody>
           <a:bodyPr>
             <a:normAutofit fontScale="77500" lnSpcReduction="20000"/>
           </a:bodyPr>
           <a:lstStyle/>
           <a:p>
-            <a:r>
-              <a:rPr lang="ru-RU" dirty="0" smtClean="0"/>
-              <a:t>Спецификация автомата и объектов управления отражена в модели на переходах и состояниях в виде контрактов, записанных на языке </a:t>
-            </a:r>
-            <a:r>
-              <a:rPr lang="en-US" dirty="0" smtClean="0"/>
-              <a:t>JML:</a:t>
-            </a:r>
-            <a:endParaRPr lang="ru-RU" dirty="0" smtClean="0"/>
-          </a:p>
-          <a:p>
-            <a:pPr lvl="1"/>
-            <a:r>
-              <a:rPr lang="ru-RU" dirty="0" smtClean="0"/>
-              <a:t>предусловий</a:t>
-            </a:r>
-          </a:p>
-          <a:p>
-            <a:pPr lvl="1"/>
-            <a:r>
-              <a:rPr lang="ru-RU" dirty="0" smtClean="0"/>
-              <a:t>постусловий</a:t>
-            </a:r>
-          </a:p>
-          <a:p>
-            <a:pPr lvl="1"/>
-            <a:r>
-              <a:rPr lang="ru-RU" dirty="0" smtClean="0"/>
-              <a:t>инвариантов</a:t>
-            </a:r>
-          </a:p>
-          <a:p>
-            <a:r>
-              <a:rPr lang="ru-RU" dirty="0" smtClean="0"/>
-              <a:t>Во время выполнения программой сгенерированных тестов используется </a:t>
+            <a:pPr marL="514350" indent="-514350">
+              <a:buFont typeface="+mj-lt"/>
+              <a:buAutoNum type="arabicPeriod"/>
+            </a:pPr>
+            <a:r>
+              <a:rPr lang="ru-RU" dirty="0" smtClean="0"/>
+              <a:t>Максимально возможная часть спецификации вносится в автоматную модель, используя расширенный конечный автомат и </a:t>
             </a:r>
             <a:r>
               <a:rPr lang="en-US" i="1" dirty="0" smtClean="0"/>
-              <a:t>JML Runtime Assertion Checker</a:t>
-            </a:r>
-            <a:r>
-              <a:rPr lang="ru-RU" dirty="0" smtClean="0"/>
-              <a:t> для динамической проверки </a:t>
-            </a:r>
-            <a:r>
-              <a:rPr lang="en-US" dirty="0" smtClean="0"/>
-              <a:t>JML-</a:t>
-            </a:r>
-            <a:r>
-              <a:rPr lang="ru-RU" dirty="0" smtClean="0"/>
-              <a:t>контрактов, записанных в модели</a:t>
-            </a:r>
-          </a:p>
-          <a:p>
-            <a:r>
-              <a:rPr lang="ru-RU" dirty="0" smtClean="0"/>
-              <a:t>Тесты, при выполнении которых обнаружено нарушение контрактов, сохраняются для последующего анализа ошибок реализации</a:t>
-            </a:r>
-          </a:p>
-          <a:p>
-            <a:pPr lvl="1"/>
-            <a:endParaRPr lang="ru-RU" dirty="0" smtClean="0"/>
+              <a:t>JML</a:t>
+            </a:r>
+            <a:r>
+              <a:rPr lang="en-US" dirty="0" smtClean="0"/>
+              <a:t>-</a:t>
+            </a:r>
+            <a:r>
+              <a:rPr lang="ru-RU" dirty="0" smtClean="0"/>
+              <a:t>контракты.</a:t>
+            </a:r>
+          </a:p>
+          <a:p>
+            <a:pPr marL="514350" indent="-514350">
+              <a:buFont typeface="+mj-lt"/>
+              <a:buAutoNum type="arabicPeriod"/>
+            </a:pPr>
+            <a:r>
+              <a:rPr lang="ru-RU" dirty="0" smtClean="0"/>
+              <a:t>Тестовые </a:t>
+            </a:r>
+            <a:r>
+              <a:rPr lang="ru-RU" dirty="0" smtClean="0"/>
+              <a:t>сценарии записываются в виде последовательности переходов </a:t>
+            </a:r>
+            <a:r>
+              <a:rPr lang="ru-RU" dirty="0" smtClean="0"/>
+              <a:t>автомата.</a:t>
+            </a:r>
+          </a:p>
+          <a:p>
+            <a:pPr marL="514350" indent="-514350">
+              <a:buFont typeface="+mj-lt"/>
+              <a:buAutoNum type="arabicPeriod"/>
+            </a:pPr>
+            <a:r>
+              <a:rPr lang="ru-RU" dirty="0" smtClean="0"/>
+              <a:t>Используя разработанный инструмент, определяются соответствующие значения переменных для выполнения заданного сценария и генерируется код для запуска </a:t>
+            </a:r>
+            <a:r>
+              <a:rPr lang="ru-RU" dirty="0" smtClean="0"/>
+              <a:t>теста.</a:t>
+            </a:r>
+          </a:p>
+          <a:p>
+            <a:pPr marL="514350" indent="-514350">
+              <a:buFont typeface="+mj-lt"/>
+              <a:buAutoNum type="arabicPeriod"/>
+            </a:pPr>
+            <a:r>
+              <a:rPr lang="ru-RU" dirty="0" smtClean="0"/>
+              <a:t>Тесты запускаются автоматически, во время их </a:t>
+            </a:r>
+            <a:r>
+              <a:rPr lang="ru-RU" dirty="0" smtClean="0"/>
+              <a:t>исполнения </a:t>
+            </a:r>
+            <a:r>
+              <a:rPr lang="ru-RU" dirty="0" smtClean="0"/>
+              <a:t>при помощи существующего инструмента проверяется выполненность требований спецификации, записанной в виде контрактов.</a:t>
+            </a:r>
+            <a:endParaRPr lang="en-US" dirty="0"/>
           </a:p>
         </p:txBody>
       </p:sp>
@@ -8157,306 +8937,6 @@
   <p:clrMapOvr>
     <a:masterClrMapping/>
   </p:clrMapOvr>
-</p:sld>
-</file>
-
-<file path=ppt/slides/slide26.xml><?xml version="1.0" encoding="utf-8"?>
-<p:sld xmlns:a="http://schemas.openxmlformats.org/drawingml/2006/main" xmlns:r="http://schemas.openxmlformats.org/officeDocument/2006/relationships" xmlns:mc="http://schemas.openxmlformats.org/markup-compatibility/2006" xmlns:mv="urn:schemas-microsoft-com:mac:vml" xmlns:p="http://schemas.openxmlformats.org/presentationml/2006/main" mc:Ignorable="mv" mc:PreserveAttributes="mv:*">
-  <p:cSld>
-    <p:spTree>
-      <p:nvGrpSpPr>
-        <p:cNvPr id="1" name=""/>
-        <p:cNvGrpSpPr/>
-        <p:nvPr/>
-      </p:nvGrpSpPr>
-      <p:grpSpPr>
-        <a:xfrm>
-          <a:off x="0" y="0"/>
-          <a:ext cx="0" cy="0"/>
-          <a:chOff x="0" y="0"/>
-          <a:chExt cx="0" cy="0"/>
-        </a:xfrm>
-      </p:grpSpPr>
-      <p:sp>
-        <p:nvSpPr>
-          <p:cNvPr id="2" name="Title 1"/>
-          <p:cNvSpPr>
-            <a:spLocks noGrp="1"/>
-          </p:cNvSpPr>
-          <p:nvPr>
-            <p:ph type="title"/>
-          </p:nvPr>
-        </p:nvSpPr>
-        <p:spPr/>
-        <p:txBody>
-          <a:bodyPr>
-            <a:normAutofit fontScale="90000"/>
-          </a:bodyPr>
-          <a:lstStyle/>
-          <a:p>
-            <a:r>
-              <a:rPr lang="ru-RU" dirty="0" smtClean="0"/>
-              <a:t>Подход к тестированию автоматных программ</a:t>
-            </a:r>
-            <a:endParaRPr lang="en-US" dirty="0"/>
-          </a:p>
-        </p:txBody>
-      </p:sp>
-      <p:sp>
-        <p:nvSpPr>
-          <p:cNvPr id="3" name="Content Placeholder 2"/>
-          <p:cNvSpPr>
-            <a:spLocks noGrp="1"/>
-          </p:cNvSpPr>
-          <p:nvPr>
-            <p:ph idx="1"/>
-          </p:nvPr>
-        </p:nvSpPr>
-        <p:spPr>
-          <a:xfrm>
-            <a:off x="457200" y="1600200"/>
-            <a:ext cx="8229600" cy="5105400"/>
-          </a:xfrm>
-        </p:spPr>
-        <p:txBody>
-          <a:bodyPr>
-            <a:normAutofit fontScale="77500" lnSpcReduction="20000"/>
-          </a:bodyPr>
-          <a:lstStyle/>
-          <a:p>
-            <a:pPr marL="514350" indent="-514350">
-              <a:buFont typeface="+mj-lt"/>
-              <a:buAutoNum type="arabicPeriod"/>
-            </a:pPr>
-            <a:r>
-              <a:rPr lang="ru-RU" dirty="0" smtClean="0"/>
-              <a:t>Максимально возможная часть спецификации вносится в автоматную модель, используя расширенный конечный автомат и </a:t>
-            </a:r>
-            <a:r>
-              <a:rPr lang="en-US" i="1" dirty="0" smtClean="0"/>
-              <a:t>JML</a:t>
-            </a:r>
-            <a:r>
-              <a:rPr lang="en-US" dirty="0" smtClean="0"/>
-              <a:t>-</a:t>
-            </a:r>
-            <a:r>
-              <a:rPr lang="ru-RU" dirty="0" smtClean="0"/>
-              <a:t>контракты</a:t>
-            </a:r>
-          </a:p>
-          <a:p>
-            <a:pPr marL="514350" indent="-514350">
-              <a:buFont typeface="+mj-lt"/>
-              <a:buAutoNum type="arabicPeriod"/>
-            </a:pPr>
-            <a:r>
-              <a:rPr lang="ru-RU" dirty="0" smtClean="0"/>
-              <a:t>Из спецификации на естественном языке выбираются интересные тестовые сценарии</a:t>
-            </a:r>
-          </a:p>
-          <a:p>
-            <a:pPr marL="514350" indent="-514350">
-              <a:buFont typeface="+mj-lt"/>
-              <a:buAutoNum type="arabicPeriod"/>
-            </a:pPr>
-            <a:r>
-              <a:rPr lang="ru-RU" dirty="0" smtClean="0"/>
-              <a:t>Тестовые сценарии записываются в виде последовательности переходов автомата</a:t>
-            </a:r>
-          </a:p>
-          <a:p>
-            <a:pPr marL="514350" indent="-514350">
-              <a:buFont typeface="+mj-lt"/>
-              <a:buAutoNum type="arabicPeriod"/>
-            </a:pPr>
-            <a:r>
-              <a:rPr lang="ru-RU" dirty="0" smtClean="0"/>
-              <a:t>Используя разработанный инструмент, определяются соответствующие значения переменных для выполнения заданного сценария и генерируется код для запуска теста</a:t>
-            </a:r>
-          </a:p>
-          <a:p>
-            <a:pPr marL="514350" indent="-514350">
-              <a:buFont typeface="+mj-lt"/>
-              <a:buAutoNum type="arabicPeriod"/>
-            </a:pPr>
-            <a:r>
-              <a:rPr lang="ru-RU" dirty="0" smtClean="0"/>
-              <a:t>Тесты запускаются автоматически, во время их исполнения, при помощи существующего инструмента проверяется выполненность требований спецификации, записанной в виде контрактов.</a:t>
-            </a:r>
-            <a:endParaRPr lang="en-US" dirty="0"/>
-          </a:p>
-        </p:txBody>
-      </p:sp>
-      <p:sp>
-        <p:nvSpPr>
-          <p:cNvPr id="4" name="Slide Number Placeholder 3"/>
-          <p:cNvSpPr>
-            <a:spLocks noGrp="1"/>
-          </p:cNvSpPr>
-          <p:nvPr>
-            <p:ph type="sldNum" sz="quarter" idx="12"/>
-          </p:nvPr>
-        </p:nvSpPr>
-        <p:spPr/>
-        <p:txBody>
-          <a:bodyPr/>
-          <a:lstStyle/>
-          <a:p>
-            <a:fld id="{568151CB-D622-4A44-AEA0-1961A84A8CBA}" type="slidenum">
-              <a:rPr lang="en-US" smtClean="0"/>
-              <a:pPr/>
-              <a:t>26</a:t>
-            </a:fld>
-            <a:endParaRPr lang="en-US"/>
-          </a:p>
-        </p:txBody>
-      </p:sp>
-    </p:spTree>
-  </p:cSld>
-  <p:clrMapOvr>
-    <a:masterClrMapping/>
-  </p:clrMapOvr>
-</p:sld>
-</file>
-
-<file path=ppt/slides/slide27.xml><?xml version="1.0" encoding="utf-8"?>
-<p:sld xmlns:a="http://schemas.openxmlformats.org/drawingml/2006/main" xmlns:r="http://schemas.openxmlformats.org/officeDocument/2006/relationships" xmlns:mc="http://schemas.openxmlformats.org/markup-compatibility/2006" xmlns:mv="urn:schemas-microsoft-com:mac:vml" xmlns:p="http://schemas.openxmlformats.org/presentationml/2006/main" mc:Ignorable="mv" mc:PreserveAttributes="mv:*">
-  <p:cSld>
-    <p:spTree>
-      <p:nvGrpSpPr>
-        <p:cNvPr id="1" name=""/>
-        <p:cNvGrpSpPr/>
-        <p:nvPr/>
-      </p:nvGrpSpPr>
-      <p:grpSpPr>
-        <a:xfrm>
-          <a:off x="0" y="0"/>
-          <a:ext cx="0" cy="0"/>
-          <a:chOff x="0" y="0"/>
-          <a:chExt cx="0" cy="0"/>
-        </a:xfrm>
-      </p:grpSpPr>
-      <p:sp>
-        <p:nvSpPr>
-          <p:cNvPr id="2" name="Title 1"/>
-          <p:cNvSpPr>
-            <a:spLocks noGrp="1"/>
-          </p:cNvSpPr>
-          <p:nvPr>
-            <p:ph type="title"/>
-          </p:nvPr>
-        </p:nvSpPr>
-        <p:spPr/>
-        <p:txBody>
-          <a:bodyPr/>
-          <a:lstStyle/>
-          <a:p>
-            <a:r>
-              <a:rPr lang="ru-RU" dirty="0" smtClean="0"/>
-              <a:t>Полученные результаты</a:t>
-            </a:r>
-            <a:endParaRPr lang="en-US" dirty="0"/>
-          </a:p>
-        </p:txBody>
-      </p:sp>
-      <p:sp>
-        <p:nvSpPr>
-          <p:cNvPr id="3" name="Content Placeholder 2"/>
-          <p:cNvSpPr>
-            <a:spLocks noGrp="1"/>
-          </p:cNvSpPr>
-          <p:nvPr>
-            <p:ph idx="1"/>
-          </p:nvPr>
-        </p:nvSpPr>
-        <p:spPr/>
-        <p:txBody>
-          <a:bodyPr>
-            <a:normAutofit fontScale="85000" lnSpcReduction="10000"/>
-          </a:bodyPr>
-          <a:lstStyle/>
-          <a:p>
-            <a:pPr lvl="0"/>
-            <a:r>
-              <a:rPr lang="ru-RU" dirty="0"/>
-              <a:t>Предложен подход к тестированию автоматных </a:t>
-            </a:r>
-            <a:r>
-              <a:rPr lang="ru-RU" dirty="0" smtClean="0"/>
-              <a:t>программ</a:t>
-            </a:r>
-            <a:endParaRPr lang="en-US" dirty="0" smtClean="0"/>
-          </a:p>
-          <a:p>
-            <a:pPr lvl="0"/>
-            <a:r>
-              <a:rPr lang="ru-RU" dirty="0"/>
-              <a:t>Предложен способ описания спецификации взаимодействия автомата и объектов </a:t>
-            </a:r>
-            <a:r>
-              <a:rPr lang="ru-RU" dirty="0" smtClean="0"/>
-              <a:t>управления</a:t>
-            </a:r>
-            <a:endParaRPr lang="en-US" dirty="0" smtClean="0"/>
-          </a:p>
-          <a:p>
-            <a:pPr lvl="0"/>
-            <a:r>
-              <a:rPr lang="ru-RU" dirty="0" smtClean="0"/>
-              <a:t>Разработан инструмент для генерации тестов по заданному сценарию для автоматных программ</a:t>
-            </a:r>
-            <a:endParaRPr lang="en-US" dirty="0" smtClean="0"/>
-          </a:p>
-          <a:p>
-            <a:r>
-              <a:rPr lang="ru-RU" dirty="0"/>
-              <a:t>Предложенный подход не только позволяет искать несоответствия между системой и ее спецификацией, но также генерировать корректные тесты для регрессионного и нагрузочного тестирования.</a:t>
-            </a:r>
-            <a:r>
-              <a:rPr lang="en-US" dirty="0" smtClean="0"/>
-              <a:t> </a:t>
-            </a:r>
-            <a:endParaRPr lang="en-US" dirty="0"/>
-          </a:p>
-        </p:txBody>
-      </p:sp>
-      <p:sp>
-        <p:nvSpPr>
-          <p:cNvPr id="4" name="Slide Number Placeholder 3"/>
-          <p:cNvSpPr>
-            <a:spLocks noGrp="1"/>
-          </p:cNvSpPr>
-          <p:nvPr>
-            <p:ph type="sldNum" sz="quarter" idx="12"/>
-          </p:nvPr>
-        </p:nvSpPr>
-        <p:spPr/>
-        <p:txBody>
-          <a:bodyPr/>
-          <a:lstStyle/>
-          <a:p>
-            <a:fld id="{568151CB-D622-4A44-AEA0-1961A84A8CBA}" type="slidenum">
-              <a:rPr lang="en-US" smtClean="0"/>
-              <a:pPr/>
-              <a:t>27</a:t>
-            </a:fld>
-            <a:endParaRPr lang="en-US"/>
-          </a:p>
-        </p:txBody>
-      </p:sp>
-    </p:spTree>
-  </p:cSld>
-  <p:clrMapOvr>
-    <a:masterClrMapping/>
-  </p:clrMapOvr>
-  <p:timing>
-    <p:tnLst>
-      <p:par>
-        <p:cTn id="1" dur="indefinite" restart="never" nodeType="tmRoot"/>
-      </p:par>
-    </p:tnLst>
-  </p:timing>
 </p:sld>
 </file>
 
@@ -8489,12 +8969,14 @@
         </p:nvSpPr>
         <p:spPr/>
         <p:txBody>
-          <a:bodyPr/>
-          <a:lstStyle/>
-          <a:p>
-            <a:r>
-              <a:rPr lang="ru-RU" dirty="0" smtClean="0"/>
-              <a:t>Проблема</a:t>
+          <a:bodyPr>
+            <a:normAutofit fontScale="90000"/>
+          </a:bodyPr>
+          <a:lstStyle/>
+          <a:p>
+            <a:r>
+              <a:rPr lang="ru-RU" dirty="0" smtClean="0"/>
+              <a:t>Проблема проверки корректности</a:t>
             </a:r>
             <a:endParaRPr lang="en-US" dirty="0"/>
           </a:p>
@@ -8581,10 +9063,7 @@
               <a:rPr lang="en-US" dirty="0" err="1" smtClean="0"/>
               <a:t>спецификации</a:t>
             </a:r>
-            <a:r>
-              <a:rPr lang="ru-RU" dirty="0" smtClean="0"/>
-              <a:t>.</a:t>
-            </a:r>
+            <a:endParaRPr lang="ru-RU" dirty="0" smtClean="0"/>
           </a:p>
           <a:p>
             <a:r>
@@ -8614,11 +9093,7 @@
             <a:pPr lvl="1"/>
             <a:r>
               <a:rPr lang="ru-RU" dirty="0" smtClean="0"/>
-              <a:t>не </a:t>
-            </a:r>
-            <a:r>
-              <a:rPr lang="ru-RU" dirty="0" smtClean="0"/>
-              <a:t>тестирует систему целиком (не затрагивает объекты управления)</a:t>
+              <a:t>не тестирует систему целиком (не затрагивает объекты управления)</a:t>
             </a:r>
           </a:p>
           <a:p>
@@ -8764,7 +9239,7 @@
         </p:spPr>
         <p:txBody>
           <a:bodyPr>
-            <a:normAutofit fontScale="85000" lnSpcReduction="10000"/>
+            <a:normAutofit fontScale="92500" lnSpcReduction="20000"/>
           </a:bodyPr>
           <a:lstStyle/>
           <a:p>
@@ -8790,7 +9265,11 @@
             </a:r>
             <a:r>
               <a:rPr lang="ru-RU" dirty="0" smtClean="0"/>
-              <a:t>для проверки корректности программ.</a:t>
+              <a:t>для проверки корректности </a:t>
+            </a:r>
+            <a:r>
+              <a:rPr lang="ru-RU" dirty="0" smtClean="0"/>
+              <a:t>программ</a:t>
             </a:r>
           </a:p>
           <a:p>
@@ -8804,32 +9283,63 @@
             </a:r>
             <a:r>
               <a:rPr lang="ru-RU" dirty="0" smtClean="0"/>
-              <a:t>целом.</a:t>
-            </a:r>
-          </a:p>
-          <a:p>
-            <a:r>
-              <a:rPr lang="ru-RU" dirty="0" smtClean="0"/>
-              <a:t>Успешное тестирование не может гарантировать отсутствие ошибок в программе, но большой набор тестов может существенно помочь в обнаружении ошибок и повысить </a:t>
-            </a:r>
-            <a:r>
-              <a:rPr lang="ru-RU" dirty="0" smtClean="0"/>
-              <a:t>надежность.</a:t>
-            </a:r>
-            <a:r>
-              <a:rPr lang="en-US" dirty="0" smtClean="0"/>
-              <a:t> </a:t>
-            </a:r>
-            <a:endParaRPr lang="ru-RU" dirty="0" smtClean="0"/>
-          </a:p>
-          <a:p>
-            <a:r>
-              <a:rPr lang="ru-RU" dirty="0" smtClean="0"/>
-              <a:t>Тестирование – трудоемкий процесс. По статистике  он занимает около половины времени разработки проекта. Надо как-то автоматизировать процесс тестирования для эффективного </a:t>
-            </a:r>
-            <a:r>
-              <a:rPr lang="ru-RU" dirty="0" smtClean="0"/>
-              <a:t>использования.</a:t>
+              <a:t>целом</a:t>
+            </a:r>
+          </a:p>
+          <a:p>
+            <a:r>
+              <a:rPr lang="ru-RU" dirty="0" smtClean="0"/>
+              <a:t>Тестирование </a:t>
+            </a:r>
+            <a:r>
+              <a:rPr lang="ru-RU" dirty="0" smtClean="0"/>
+              <a:t>не может гарантировать отсутствие </a:t>
+            </a:r>
+            <a:r>
+              <a:rPr lang="ru-RU" dirty="0" smtClean="0"/>
+              <a:t>ошибок, </a:t>
+            </a:r>
+            <a:r>
+              <a:rPr lang="ru-RU" dirty="0" smtClean="0"/>
+              <a:t>но</a:t>
+            </a:r>
+            <a:r>
+              <a:rPr lang="ru-RU" dirty="0" smtClean="0"/>
+              <a:t> помогает </a:t>
+            </a:r>
+            <a:r>
+              <a:rPr lang="ru-RU" dirty="0" smtClean="0"/>
+              <a:t>в</a:t>
+            </a:r>
+            <a:r>
+              <a:rPr lang="ru-RU" dirty="0" smtClean="0"/>
+              <a:t> их обнаружении</a:t>
+            </a:r>
+          </a:p>
+          <a:p>
+            <a:r>
+              <a:rPr lang="ru-RU" dirty="0" smtClean="0"/>
+              <a:t>Тестирование – трудоемкий процесс. По </a:t>
+            </a:r>
+            <a:r>
+              <a:rPr lang="ru-RU" dirty="0" smtClean="0"/>
+              <a:t>статистике </a:t>
+            </a:r>
+            <a:r>
+              <a:rPr lang="ru-RU" dirty="0" smtClean="0"/>
+              <a:t>он занимает около половины времени разработки проекта.</a:t>
+            </a:r>
+            <a:r>
+              <a:rPr lang="ru-RU" dirty="0" smtClean="0"/>
+              <a:t> Необходимо автоматизировать </a:t>
+            </a:r>
+            <a:r>
+              <a:rPr lang="ru-RU" dirty="0" smtClean="0"/>
+              <a:t>процесс </a:t>
+            </a:r>
+            <a:r>
+              <a:rPr lang="ru-RU" dirty="0" smtClean="0"/>
+              <a:t>тестирования.</a:t>
             </a:r>
             <a:endParaRPr lang="en-US" dirty="0" smtClean="0"/>
           </a:p>
@@ -8913,11 +9423,7 @@
           <a:p>
             <a:r>
               <a:rPr lang="ru-RU" dirty="0" smtClean="0"/>
-              <a:t>Актуальность </a:t>
-            </a:r>
-            <a:r>
-              <a:rPr lang="ru-RU" dirty="0" smtClean="0"/>
-              <a:t>проблемы</a:t>
+              <a:t>Актуальность проблемы</a:t>
             </a:r>
             <a:endParaRPr lang="en-US" dirty="0"/>
           </a:p>
@@ -8947,95 +9453,81 @@
           <a:p>
             <a:r>
               <a:rPr lang="ru-RU" dirty="0" smtClean="0"/>
-              <a:t>Существующие подходы для автоматных программ не позволяют проверять всю систему вцелом.</a:t>
+              <a:t>Существующие подходы для автоматных программ не позволяют проверять всю систему </a:t>
+            </a:r>
+            <a:r>
+              <a:rPr lang="ru-RU" dirty="0" smtClean="0"/>
+              <a:t>вцелом</a:t>
+            </a:r>
+          </a:p>
+          <a:p>
+            <a:r>
+              <a:rPr lang="ru-RU" dirty="0" smtClean="0"/>
+              <a:t>Работы про проверку расширенных конечных автоматов (</a:t>
+            </a:r>
+            <a:r>
+              <a:rPr lang="en-US" dirty="0" smtClean="0"/>
+              <a:t>EFSMs</a:t>
+            </a:r>
+            <a:r>
+              <a:rPr lang="ru-RU" dirty="0" smtClean="0"/>
+              <a:t>)</a:t>
+            </a:r>
+            <a:r>
+              <a:rPr lang="en-US" dirty="0" smtClean="0"/>
+              <a:t> </a:t>
+            </a:r>
+            <a:r>
+              <a:rPr lang="ru-RU" dirty="0" smtClean="0"/>
+              <a:t>не учитывают существование объектов управления и взаимодействие модели с </a:t>
+            </a:r>
+            <a:r>
+              <a:rPr lang="ru-RU" dirty="0" smtClean="0"/>
+              <a:t>ними</a:t>
+            </a:r>
+          </a:p>
+          <a:p>
+            <a:r>
+              <a:rPr lang="ru-RU" dirty="0" smtClean="0"/>
+              <a:t>Подходы к тестированию традиционных программ не могут использовать специфику автоматного подхода</a:t>
+            </a:r>
+            <a:r>
+              <a:rPr lang="en-US" dirty="0" smtClean="0"/>
+              <a:t>:</a:t>
             </a:r>
             <a:endParaRPr lang="ru-RU" dirty="0" smtClean="0"/>
           </a:p>
           <a:p>
-            <a:r>
-              <a:rPr lang="ru-RU" dirty="0" smtClean="0"/>
-              <a:t>Р</a:t>
-            </a:r>
-            <a:r>
-              <a:rPr lang="ru-RU" dirty="0" smtClean="0"/>
-              <a:t>аботы про проверку </a:t>
-            </a:r>
-            <a:r>
-              <a:rPr lang="ru-RU" dirty="0" smtClean="0"/>
-              <a:t>расширенных конечных автоматов (</a:t>
-            </a:r>
-            <a:r>
-              <a:rPr lang="en-US" dirty="0" smtClean="0"/>
-              <a:t>EFSMs</a:t>
-            </a:r>
-            <a:r>
-              <a:rPr lang="ru-RU" dirty="0" smtClean="0"/>
-              <a:t>)</a:t>
-            </a:r>
-            <a:r>
-              <a:rPr lang="en-US" dirty="0" smtClean="0"/>
-              <a:t> </a:t>
-            </a:r>
-            <a:r>
-              <a:rPr lang="ru-RU" dirty="0" smtClean="0"/>
-              <a:t>не учитывают</a:t>
-            </a:r>
-            <a:r>
-              <a:rPr lang="ru-RU" dirty="0" smtClean="0"/>
-              <a:t> существование объектов управления и взаимодействие модели с ними.</a:t>
+            <a:pPr lvl="1"/>
+            <a:r>
+              <a:rPr lang="ru-RU" dirty="0" smtClean="0"/>
+              <a:t>могут тестировать сгенерированный из автомата код</a:t>
+            </a:r>
+            <a:r>
+              <a:rPr lang="en-US" dirty="0" smtClean="0"/>
+              <a:t>;</a:t>
+            </a:r>
+          </a:p>
+          <a:p>
+            <a:pPr lvl="1"/>
+            <a:r>
+              <a:rPr lang="ru-RU" dirty="0" smtClean="0"/>
+              <a:t>теряются все преимущества автоматного подхода</a:t>
+            </a:r>
+            <a:r>
+              <a:rPr lang="en-US" dirty="0" smtClean="0"/>
+              <a:t>.</a:t>
             </a:r>
             <a:endParaRPr lang="ru-RU" dirty="0" smtClean="0"/>
           </a:p>
           <a:p>
             <a:r>
               <a:rPr lang="ru-RU" dirty="0" smtClean="0"/>
-              <a:t>Подходы к тестированию традиционных программ не</a:t>
-            </a:r>
-            <a:r>
-              <a:rPr lang="ru-RU" dirty="0" smtClean="0"/>
-              <a:t> могут использовать специфику автоматного подхода</a:t>
-            </a:r>
-            <a:r>
-              <a:rPr lang="en-US" dirty="0" smtClean="0"/>
-              <a:t>:</a:t>
-            </a:r>
-            <a:endParaRPr lang="ru-RU" dirty="0" smtClean="0"/>
-          </a:p>
-          <a:p>
-            <a:pPr lvl="1"/>
-            <a:r>
-              <a:rPr lang="ru-RU" dirty="0" smtClean="0"/>
-              <a:t>могут тестировать сгенерированный из автомата код</a:t>
-            </a:r>
-            <a:r>
-              <a:rPr lang="en-US" dirty="0" smtClean="0"/>
-              <a:t>;</a:t>
-            </a:r>
-          </a:p>
-          <a:p>
-            <a:pPr lvl="1"/>
-            <a:r>
-              <a:rPr lang="ru-RU" dirty="0" smtClean="0"/>
-              <a:t>теряются все преимущества автоматного подхода</a:t>
-            </a:r>
-            <a:r>
-              <a:rPr lang="en-US" dirty="0" smtClean="0"/>
-              <a:t>.</a:t>
-            </a:r>
-            <a:endParaRPr lang="ru-RU" dirty="0" smtClean="0"/>
-          </a:p>
-          <a:p>
-            <a:r>
-              <a:rPr lang="ru-RU" dirty="0" smtClean="0"/>
               <a:t>Тестирование трудоемко, поэтому автоматизация </a:t>
             </a:r>
             <a:r>
               <a:rPr lang="ru-RU" dirty="0" smtClean="0"/>
               <a:t>принципиальна</a:t>
-            </a:r>
-            <a:r>
-              <a:rPr lang="en-US" dirty="0" smtClean="0"/>
-              <a:t>.</a:t>
             </a:r>
             <a:endParaRPr lang="en-US" dirty="0"/>
           </a:p>
@@ -9116,11 +9608,7 @@
           <a:p>
             <a:r>
               <a:rPr lang="ru-RU" dirty="0" smtClean="0"/>
-              <a:t>Т</a:t>
-            </a:r>
-            <a:r>
-              <a:rPr lang="ru-RU" dirty="0" smtClean="0"/>
-              <a:t>естирование </a:t>
+              <a:t>Задачи для тестирования </a:t>
             </a:r>
             <a:r>
               <a:rPr lang="ru-RU" dirty="0" smtClean="0"/>
@@ -9189,11 +9677,7 @@
             </a:r>
             <a:r>
               <a:rPr lang="ru-RU" dirty="0" smtClean="0"/>
-              <a:t>.</a:t>
-            </a:r>
-            <a:r>
-              <a:rPr lang="ru-RU" dirty="0" smtClean="0"/>
-              <a:t> </a:t>
+              <a:t>. </a:t>
             </a:r>
           </a:p>
           <a:p>
@@ -9370,9 +9854,8 @@
             </a:r>
             <a:r>
               <a:rPr lang="ru-RU" dirty="0" smtClean="0"/>
-              <a:t>языке.</a:t>
-            </a:r>
-            <a:endParaRPr lang="ru-RU" dirty="0" smtClean="0"/>
+              <a:t>языке</a:t>
+            </a:r>
           </a:p>
           <a:p>
             <a:r>
@@ -9416,19 +9899,7 @@
             <a:pPr lvl="1"/>
             <a:r>
               <a:rPr lang="ru-RU" dirty="0" smtClean="0"/>
-              <a:t>пользователь может </a:t>
-            </a:r>
-            <a:r>
-              <a:rPr lang="ru-RU" dirty="0" smtClean="0"/>
-              <a:t>снимать </a:t>
-            </a:r>
-            <a:r>
-              <a:rPr lang="ru-RU" dirty="0" smtClean="0"/>
-              <a:t>деньги произвольное количество раз,</a:t>
-            </a:r>
-            <a:r>
-              <a:rPr lang="ru-RU" dirty="0" smtClean="0"/>
-              <a:t> пока есть деньги на счету</a:t>
+              <a:t>пользователь может снимать деньги произвольное количество раз, пока есть деньги на счету</a:t>
             </a:r>
             <a:r>
               <a:rPr lang="en-US" dirty="0" smtClean="0"/>
@@ -9440,11 +9911,7 @@
             <a:pPr lvl="1"/>
             <a:r>
               <a:rPr lang="ru-RU" dirty="0" smtClean="0"/>
-              <a:t>Ввод суммы для снятия </a:t>
-            </a:r>
-            <a:r>
-              <a:rPr lang="ru-RU" dirty="0" smtClean="0"/>
-              <a:t>происходит с клавиатуры,</a:t>
+              <a:t>Ввод суммы для снятия происходит с клавиатуры,</a:t>
             </a:r>
             <a:r>
               <a:rPr lang="en-US" dirty="0" smtClean="0"/>
@@ -9452,23 +9919,7 @@
             </a:r>
             <a:r>
               <a:rPr lang="ru-RU" dirty="0" smtClean="0"/>
-              <a:t>пользователь может вве</a:t>
-            </a:r>
-            <a:r>
-              <a:rPr lang="ru-RU" dirty="0" smtClean="0"/>
-              <a:t>с</a:t>
-            </a:r>
-            <a:r>
-              <a:rPr lang="ru-RU" dirty="0" smtClean="0"/>
-              <a:t>ти число от 1000 </a:t>
-            </a:r>
-            <a:r>
-              <a:rPr lang="ru-RU" dirty="0" smtClean="0"/>
-              <a:t>до</a:t>
-            </a:r>
-            <a:r>
-              <a:rPr lang="ru-RU" dirty="0" smtClean="0"/>
-              <a:t> 15000</a:t>
+              <a:t>пользователь может ввести число от 1000 до 15000</a:t>
             </a:r>
             <a:r>
               <a:rPr lang="en-US" dirty="0" smtClean="0"/>
@@ -9490,11 +9941,7 @@
           <a:p>
             <a:r>
               <a:rPr lang="ru-RU" dirty="0" smtClean="0"/>
-              <a:t>Такая </a:t>
-            </a:r>
-            <a:r>
-              <a:rPr lang="ru-RU" dirty="0" smtClean="0"/>
-              <a:t>спецификация пригодна только для ручного тестирования</a:t>
+              <a:t>Такая спецификация пригодна только для ручного тестирования</a:t>
             </a:r>
             <a:endParaRPr lang="en-US" dirty="0" smtClean="0"/>
           </a:p>
@@ -9656,11 +10103,7 @@
             <a:pPr lvl="1"/>
             <a:r>
               <a:rPr lang="ru-RU" dirty="0" smtClean="0"/>
-              <a:t>пользователь </a:t>
-            </a:r>
-            <a:r>
-              <a:rPr lang="ru-RU" dirty="0" smtClean="0"/>
-              <a:t>может снимать деньги произвольное количество раз, пока есть деньги на счету</a:t>
+              <a:t>пользователь может снимать деньги произвольное количество раз, пока есть деньги на счету</a:t>
             </a:r>
             <a:r>
               <a:rPr lang="en-US" dirty="0" smtClean="0"/>
@@ -9671,19 +10114,7 @@
             <a:pPr lvl="1"/>
             <a:r>
               <a:rPr lang="ru-RU" dirty="0" smtClean="0"/>
-              <a:t>В день со счета</a:t>
-            </a:r>
-            <a:r>
-              <a:rPr lang="ru-RU" dirty="0" smtClean="0"/>
-              <a:t> может </a:t>
-            </a:r>
-            <a:r>
-              <a:rPr lang="ru-RU" dirty="0" smtClean="0"/>
-              <a:t>быть снято</a:t>
-            </a:r>
-            <a:r>
-              <a:rPr lang="ru-RU" dirty="0" smtClean="0"/>
-              <a:t> не более </a:t>
+              <a:t>В день со счета может быть снято не более </a:t>
             </a:r>
             <a:r>
               <a:rPr lang="en-US" dirty="0" smtClean="0"/>
@@ -9694,15 +10125,7 @@
           <a:p>
             <a:r>
               <a:rPr lang="ru-RU" dirty="0" smtClean="0"/>
-              <a:t>Требования </a:t>
-            </a:r>
-            <a:r>
-              <a:rPr lang="ru-RU" dirty="0" smtClean="0"/>
-              <a:t>к объектам </a:t>
-            </a:r>
-            <a:r>
-              <a:rPr lang="ru-RU" dirty="0" smtClean="0"/>
-              <a:t>управления</a:t>
+              <a:t>Требования к объектам управления</a:t>
             </a:r>
             <a:r>
               <a:rPr lang="en-US" dirty="0" smtClean="0"/>
@@ -9726,27 +10149,7 @@
             <a:pPr lvl="1"/>
             <a:r>
               <a:rPr lang="ru-RU" dirty="0" smtClean="0"/>
-              <a:t>пользователь может </a:t>
-            </a:r>
-            <a:r>
-              <a:rPr lang="ru-RU" dirty="0" smtClean="0"/>
-              <a:t>вве</a:t>
-            </a:r>
-            <a:r>
-              <a:rPr lang="ru-RU" dirty="0" smtClean="0"/>
-              <a:t>с</a:t>
-            </a:r>
-            <a:r>
-              <a:rPr lang="ru-RU" dirty="0" smtClean="0"/>
-              <a:t>ти на клавиатуре число </a:t>
-            </a:r>
-            <a:r>
-              <a:rPr lang="ru-RU" dirty="0" smtClean="0"/>
-              <a:t>от 1000 до </a:t>
-            </a:r>
-            <a:r>
-              <a:rPr lang="ru-RU" dirty="0" smtClean="0"/>
-              <a:t>15000</a:t>
+              <a:t>пользователь может ввести на клавиатуре число от 1000 до 15000</a:t>
             </a:r>
             <a:r>
               <a:rPr lang="en-US" dirty="0" smtClean="0"/>
@@ -9843,15 +10246,7 @@
           <a:p>
             <a:r>
               <a:rPr lang="en-US" sz="2800" dirty="0" smtClean="0"/>
-              <a:t>@</a:t>
-            </a:r>
-            <a:r>
-              <a:rPr lang="en-US" sz="2800" dirty="0" err="1" smtClean="0"/>
-              <a:t>todo</a:t>
-            </a:r>
-            <a:r>
-              <a:rPr lang="en-US" sz="2800" dirty="0" smtClean="0"/>
-              <a:t> I</a:t>
+              <a:t>I</a:t>
             </a:r>
             <a:r>
               <a:rPr lang="en-US" sz="2800" dirty="0" smtClean="0"/>
@@ -9883,169 +10278,129 @@
         </p:spPr>
         <p:txBody>
           <a:bodyPr>
-            <a:normAutofit fontScale="92500" lnSpcReduction="10000"/>
+            <a:normAutofit fontScale="77500" lnSpcReduction="20000"/>
           </a:bodyPr>
           <a:lstStyle/>
           <a:p>
             <a:pPr lvl="0"/>
             <a:r>
-              <a:rPr lang="en-US" sz="2400" dirty="0" smtClean="0"/>
+              <a:rPr lang="en-US" sz="2824" dirty="0" smtClean="0"/>
               <a:t>e0 </a:t>
             </a:r>
             <a:r>
-              <a:rPr lang="en-US" sz="2400" dirty="0"/>
+              <a:rPr lang="en-US" sz="2824" dirty="0"/>
               <a:t>–</a:t>
             </a:r>
             <a:r>
-              <a:rPr lang="en-US" sz="2400" dirty="0" smtClean="0"/>
+              <a:rPr lang="en-US" sz="2824" dirty="0" smtClean="0"/>
               <a:t> </a:t>
             </a:r>
             <a:r>
-              <a:rPr lang="ru-RU" sz="2400" dirty="0" smtClean="0"/>
+              <a:rPr lang="ru-RU" sz="2824" dirty="0" smtClean="0"/>
               <a:t>инициализация</a:t>
             </a:r>
-            <a:endParaRPr lang="en-US" sz="2400" dirty="0" smtClean="0"/>
+            <a:endParaRPr lang="en-US" sz="2824" dirty="0" smtClean="0"/>
           </a:p>
           <a:p>
             <a:pPr lvl="0"/>
             <a:r>
-              <a:rPr lang="en-US" sz="2400" dirty="0"/>
-              <a:t>e1 – </a:t>
-            </a:r>
-            <a:r>
-              <a:rPr lang="ru-RU" sz="2400" dirty="0"/>
-              <a:t>начало </a:t>
-            </a:r>
-            <a:r>
-              <a:rPr lang="ru-RU" sz="2400" dirty="0" smtClean="0"/>
-              <a:t>работы</a:t>
-            </a:r>
-            <a:endParaRPr lang="en-US" sz="2400" dirty="0" smtClean="0"/>
+              <a:rPr lang="en-US" sz="2824" dirty="0"/>
+              <a:t>e1 –</a:t>
+            </a:r>
+            <a:r>
+              <a:rPr lang="en-US" sz="2824" dirty="0" smtClean="0"/>
+              <a:t> </a:t>
+            </a:r>
+            <a:r>
+              <a:rPr lang="ru-RU" sz="2824" dirty="0" smtClean="0"/>
+              <a:t>введена сумма</a:t>
+            </a:r>
+            <a:endParaRPr lang="en-US" sz="2824" dirty="0" smtClean="0"/>
           </a:p>
           <a:p>
             <a:pPr lvl="0"/>
             <a:r>
-              <a:rPr lang="ru-RU" sz="2400" dirty="0"/>
+              <a:rPr lang="ru-RU" sz="2824" dirty="0"/>
               <a:t>e2 –</a:t>
             </a:r>
             <a:r>
-              <a:rPr lang="ru-RU" sz="2400" dirty="0" smtClean="0"/>
-              <a:t> недопустимая сумма</a:t>
-            </a:r>
-            <a:endParaRPr lang="en-US" sz="2400" dirty="0" smtClean="0"/>
+              <a:rPr lang="ru-RU" sz="2824" dirty="0" smtClean="0"/>
+              <a:t> операция выполнена</a:t>
+            </a:r>
+            <a:endParaRPr lang="en-US" sz="2824" dirty="0" smtClean="0"/>
           </a:p>
           <a:p>
             <a:pPr lvl="0"/>
             <a:r>
-              <a:rPr lang="en-US" sz="2400" dirty="0" err="1" smtClean="0"/>
+              <a:rPr lang="en-US" sz="2824" dirty="0" err="1" smtClean="0"/>
               <a:t>e</a:t>
             </a:r>
             <a:r>
-              <a:rPr lang="ru-RU" sz="2400" dirty="0" smtClean="0"/>
+              <a:rPr lang="ru-RU" sz="2824" dirty="0" smtClean="0"/>
               <a:t>3 </a:t>
             </a:r>
             <a:r>
-              <a:rPr lang="ru-RU" sz="2400" dirty="0"/>
+              <a:rPr lang="ru-RU" sz="2824" dirty="0"/>
               <a:t>–</a:t>
             </a:r>
             <a:r>
-              <a:rPr lang="ru-RU" sz="2400" dirty="0" smtClean="0"/>
-              <a:t> допустимая сумма</a:t>
-            </a:r>
-            <a:endParaRPr lang="en-US" sz="2400" dirty="0" smtClean="0"/>
+              <a:rPr lang="ru-RU" sz="2824" dirty="0" smtClean="0"/>
+              <a:t> ошибка</a:t>
+            </a:r>
+            <a:endParaRPr lang="en-US" sz="2824" dirty="0" smtClean="0"/>
           </a:p>
           <a:p>
             <a:pPr lvl="0"/>
-            <a:r>
-              <a:rPr lang="en-US" sz="2400" dirty="0" smtClean="0"/>
-              <a:t>e4 </a:t>
-            </a:r>
-            <a:r>
-              <a:rPr lang="en-US" sz="2400" dirty="0"/>
-              <a:t>– </a:t>
-            </a:r>
-            <a:r>
-              <a:rPr lang="ru-RU" sz="2400" dirty="0"/>
-              <a:t>недостаточно </a:t>
-            </a:r>
-            <a:r>
-              <a:rPr lang="ru-RU" sz="2400" dirty="0" smtClean="0"/>
-              <a:t>средств</a:t>
-            </a:r>
-            <a:endParaRPr lang="en-US" sz="2400" dirty="0" smtClean="0"/>
+            <a:endParaRPr lang="ru-RU" sz="2595" dirty="0" smtClean="0"/>
           </a:p>
           <a:p>
             <a:pPr lvl="0"/>
-            <a:r>
-              <a:rPr lang="en-US" sz="2400" dirty="0" smtClean="0"/>
-              <a:t>e5 –</a:t>
-            </a:r>
-            <a:r>
-              <a:rPr lang="ru-RU" sz="2400" dirty="0" smtClean="0"/>
-              <a:t> операция выполнена</a:t>
-            </a:r>
-          </a:p>
-          <a:p>
-            <a:pPr lvl="0">
-              <a:buNone/>
-            </a:pPr>
-            <a:r>
-              <a:rPr lang="en-US" sz="2400" dirty="0" smtClean="0"/>
-              <a:t> </a:t>
-            </a:r>
+            <a:endParaRPr lang="ru-RU" sz="2595" dirty="0" smtClean="0"/>
           </a:p>
           <a:p>
             <a:pPr lvl="0"/>
-            <a:r>
-              <a:rPr lang="ru-RU" sz="2595" dirty="0" smtClean="0"/>
-              <a:t>Конечный автомат позволяет описать последовательность переходов между состояниями и возможные события в системе</a:t>
-            </a:r>
+            <a:endParaRPr lang="ru-RU" sz="2595" dirty="0" smtClean="0"/>
           </a:p>
           <a:p>
             <a:pPr lvl="0"/>
-            <a:r>
-              <a:rPr lang="ru-RU" sz="2595" dirty="0" smtClean="0"/>
+            <a:endParaRPr lang="ru-RU" sz="2595" dirty="0" smtClean="0"/>
+          </a:p>
+          <a:p>
+            <a:pPr lvl="0"/>
+            <a:r>
+              <a:rPr lang="ru-RU" sz="3097" dirty="0" smtClean="0"/>
+              <a:t>Конечный </a:t>
+            </a:r>
+            <a:r>
+              <a:rPr lang="ru-RU" sz="3097" dirty="0" smtClean="0"/>
+              <a:t>автомат позволяет описать последовательность переходов между состояниями и возможные события в системе</a:t>
+            </a:r>
+          </a:p>
+          <a:p>
+            <a:pPr lvl="0"/>
+            <a:r>
+              <a:rPr lang="ru-RU" sz="3097" dirty="0" smtClean="0"/>
               <a:t>Часть логики реализована в объектах управления и не входит в автоматную модель</a:t>
             </a:r>
             <a:r>
-              <a:rPr lang="en-US" sz="2595" dirty="0" smtClean="0"/>
+              <a:rPr lang="en-US" sz="3097" dirty="0" smtClean="0"/>
               <a:t>:</a:t>
             </a:r>
-            <a:endParaRPr lang="en-US" dirty="0" smtClean="0"/>
+            <a:endParaRPr lang="en-US" sz="3613" dirty="0" smtClean="0"/>
           </a:p>
           <a:p>
             <a:pPr lvl="1"/>
             <a:r>
-              <a:rPr lang="ru-RU" sz="2595" dirty="0" smtClean="0"/>
+              <a:rPr lang="ru-RU" sz="3097" dirty="0" smtClean="0"/>
               <a:t>Когда можно снимать деньги и когда нельзя?</a:t>
             </a:r>
-            <a:endParaRPr lang="en-US" sz="2595" dirty="0" smtClean="0"/>
+            <a:endParaRPr lang="en-US" sz="3097" dirty="0" smtClean="0"/>
           </a:p>
           <a:p>
             <a:endParaRPr lang="en-US" dirty="0"/>
           </a:p>
         </p:txBody>
       </p:sp>
-      <p:graphicFrame>
-        <p:nvGraphicFramePr>
-          <p:cNvPr id="16386" name="Object 2"/>
-          <p:cNvGraphicFramePr>
-            <a:graphicFrameLocks noChangeAspect="1"/>
-          </p:cNvGraphicFramePr>
-          <p:nvPr/>
-        </p:nvGraphicFramePr>
-        <p:xfrm>
-          <a:off x="4857750" y="1219200"/>
-          <a:ext cx="3829050" cy="2933701"/>
-        </p:xfrm>
-        <a:graphic>
-          <a:graphicData uri="http://schemas.openxmlformats.org/presentationml/2006/ole">
-            <p:oleObj spid="_x0000_s16386" name="Document" r:id="rId3" imgW="2552700" imgH="1955800" progId="Word.Document.12">
-              <p:link updateAutomatic="1"/>
-            </p:oleObj>
-          </a:graphicData>
-        </a:graphic>
-      </p:graphicFrame>
       <p:sp>
         <p:nvSpPr>
           <p:cNvPr id="5" name="Slide Number Placeholder 4"/>
@@ -10070,6 +10425,30 @@
           </a:p>
         </p:txBody>
       </p:sp>
+      <p:pic>
+        <p:nvPicPr>
+          <p:cNvPr id="8" name="Picture 7" descr="fsm.png"/>
+          <p:cNvPicPr>
+            <a:picLocks noChangeAspect="1"/>
+          </p:cNvPicPr>
+          <p:nvPr/>
+        </p:nvPicPr>
+        <p:blipFill>
+          <a:blip r:embed="rId2"/>
+          <a:stretch>
+            <a:fillRect/>
+          </a:stretch>
+        </p:blipFill>
+        <p:spPr>
+          <a:xfrm>
+            <a:off x="4343401" y="1190577"/>
+            <a:ext cx="3657600" cy="2924223"/>
+          </a:xfrm>
+          <a:prstGeom prst="rect">
+            <a:avLst/>
+          </a:prstGeom>
+        </p:spPr>
+      </p:pic>
     </p:spTree>
   </p:cSld>
   <p:clrMapOvr>

</xml_diff>